<commit_message>
Added overview slide summarizing planned talk material
</commit_message>
<xml_diff>
--- a/presentation_part2.pptx
+++ b/presentation_part2.pptx
@@ -11,9 +11,10 @@
     <p:sldId id="260" r:id="rId5"/>
     <p:sldId id="259" r:id="rId6"/>
     <p:sldId id="261" r:id="rId7"/>
-    <p:sldId id="262" r:id="rId8"/>
-    <p:sldId id="263" r:id="rId9"/>
-    <p:sldId id="264" r:id="rId10"/>
+    <p:sldId id="265" r:id="rId8"/>
+    <p:sldId id="262" r:id="rId9"/>
+    <p:sldId id="263" r:id="rId10"/>
+    <p:sldId id="264" r:id="rId11"/>
   </p:sldIdLst>
   <p:sldSz cx="12192000" cy="6858000"/>
   <p:notesSz cx="6858000" cy="9144000"/>
@@ -3559,6 +3560,139 @@
 </p:sld>
 </file>
 
+<file path=ppt/slides/slide10.xml><?xml version="1.0" encoding="utf-8"?>
+<p:sld xmlns:a="http://schemas.openxmlformats.org/drawingml/2006/main" xmlns:r="http://schemas.openxmlformats.org/officeDocument/2006/relationships" xmlns:p="http://schemas.openxmlformats.org/presentationml/2006/main">
+  <p:cSld>
+    <p:spTree>
+      <p:nvGrpSpPr>
+        <p:cNvPr id="1" name=""/>
+        <p:cNvGrpSpPr/>
+        <p:nvPr/>
+      </p:nvGrpSpPr>
+      <p:grpSpPr>
+        <a:xfrm>
+          <a:off x="0" y="0"/>
+          <a:ext cx="0" cy="0"/>
+          <a:chOff x="0" y="0"/>
+          <a:chExt cx="0" cy="0"/>
+        </a:xfrm>
+      </p:grpSpPr>
+      <p:sp>
+        <p:nvSpPr>
+          <p:cNvPr id="2" name="Title 1">
+            <a:extLst>
+              <a:ext uri="{FF2B5EF4-FFF2-40B4-BE49-F238E27FC236}">
+                <a16:creationId xmlns:a16="http://schemas.microsoft.com/office/drawing/2014/main" id="{2F4B5B6B-99E7-417D-BABC-62CD3DA1AA89}"/>
+              </a:ext>
+            </a:extLst>
+          </p:cNvPr>
+          <p:cNvSpPr>
+            <a:spLocks noGrp="1"/>
+          </p:cNvSpPr>
+          <p:nvPr>
+            <p:ph type="title"/>
+          </p:nvPr>
+        </p:nvSpPr>
+        <p:spPr/>
+        <p:txBody>
+          <a:bodyPr>
+            <a:normAutofit/>
+          </a:bodyPr>
+          <a:lstStyle/>
+          <a:p>
+            <a:r>
+              <a:rPr lang="en-CA" sz="3600" dirty="0">
+                <a:latin typeface="Arial" panose="020B0604020202020204" pitchFamily="34" charset="0"/>
+                <a:cs typeface="Arial" panose="020B0604020202020204" pitchFamily="34" charset="0"/>
+              </a:rPr>
+              <a:t>Track file versions</a:t>
+            </a:r>
+          </a:p>
+        </p:txBody>
+      </p:sp>
+      <p:sp>
+        <p:nvSpPr>
+          <p:cNvPr id="3" name="Content Placeholder 2">
+            <a:extLst>
+              <a:ext uri="{FF2B5EF4-FFF2-40B4-BE49-F238E27FC236}">
+                <a16:creationId xmlns:a16="http://schemas.microsoft.com/office/drawing/2014/main" id="{199AD3BA-A31A-452F-99C1-8A631BB832C9}"/>
+              </a:ext>
+            </a:extLst>
+          </p:cNvPr>
+          <p:cNvSpPr>
+            <a:spLocks noGrp="1"/>
+          </p:cNvSpPr>
+          <p:nvPr>
+            <p:ph idx="1"/>
+          </p:nvPr>
+        </p:nvSpPr>
+        <p:spPr/>
+        <p:txBody>
+          <a:bodyPr/>
+          <a:lstStyle/>
+          <a:p>
+            <a:r>
+              <a:rPr lang="en-CA" dirty="0">
+                <a:latin typeface="Arial" panose="020B0604020202020204" pitchFamily="34" charset="0"/>
+                <a:cs typeface="Arial" panose="020B0604020202020204" pitchFamily="34" charset="0"/>
+              </a:rPr>
+              <a:t>“_v1”, “_v2,”, “_v12”, “_final”, “_final2” – where does it end?!</a:t>
+            </a:r>
+          </a:p>
+          <a:p>
+            <a:r>
+              <a:rPr lang="en-CA" dirty="0">
+                <a:latin typeface="Arial" panose="020B0604020202020204" pitchFamily="34" charset="0"/>
+                <a:cs typeface="Arial" panose="020B0604020202020204" pitchFamily="34" charset="0"/>
+              </a:rPr>
+              <a:t>It ends with a file versioning system.</a:t>
+            </a:r>
+          </a:p>
+          <a:p>
+            <a:pPr lvl="1"/>
+            <a:r>
+              <a:rPr lang="en-CA" dirty="0">
+                <a:latin typeface="Arial" panose="020B0604020202020204" pitchFamily="34" charset="0"/>
+                <a:cs typeface="Arial" panose="020B0604020202020204" pitchFamily="34" charset="0"/>
+              </a:rPr>
+              <a:t>One file with a consistent file name</a:t>
+            </a:r>
+          </a:p>
+          <a:p>
+            <a:pPr lvl="1"/>
+            <a:r>
+              <a:rPr lang="en-CA" dirty="0">
+                <a:latin typeface="Arial" panose="020B0604020202020204" pitchFamily="34" charset="0"/>
+                <a:cs typeface="Arial" panose="020B0604020202020204" pitchFamily="34" charset="0"/>
+              </a:rPr>
+              <a:t>Modifications to the file are tracked by the versioning system</a:t>
+            </a:r>
+          </a:p>
+          <a:p>
+            <a:pPr lvl="1"/>
+            <a:r>
+              <a:rPr lang="en-CA" dirty="0">
+                <a:latin typeface="Arial" panose="020B0604020202020204" pitchFamily="34" charset="0"/>
+                <a:cs typeface="Arial" panose="020B0604020202020204" pitchFamily="34" charset="0"/>
+              </a:rPr>
+              <a:t>Earlier incarnations of the file are accessible if you decide you need to revert to an earlier version</a:t>
+            </a:r>
+          </a:p>
+        </p:txBody>
+      </p:sp>
+    </p:spTree>
+    <p:extLst>
+      <p:ext uri="{BB962C8B-B14F-4D97-AF65-F5344CB8AC3E}">
+        <p14:creationId xmlns:p14="http://schemas.microsoft.com/office/powerpoint/2010/main" val="1877003925"/>
+      </p:ext>
+    </p:extLst>
+  </p:cSld>
+  <p:clrMapOvr>
+    <a:masterClrMapping/>
+  </p:clrMapOvr>
+</p:sld>
+</file>
+
 <file path=ppt/slides/slide2.xml><?xml version="1.0" encoding="utf-8"?>
 <p:sld xmlns:a="http://schemas.openxmlformats.org/drawingml/2006/main" xmlns:r="http://schemas.openxmlformats.org/officeDocument/2006/relationships" xmlns:p="http://schemas.openxmlformats.org/presentationml/2006/main">
   <p:cSld>
@@ -4392,23 +4526,47 @@
           <p:cNvPr id="2" name="Title 1">
             <a:extLst>
               <a:ext uri="{FF2B5EF4-FFF2-40B4-BE49-F238E27FC236}">
-                <a16:creationId xmlns:a16="http://schemas.microsoft.com/office/drawing/2014/main" id="{2F4B5B6B-99E7-417D-BABC-62CD3DA1AA89}"/>
-              </a:ext>
-            </a:extLst>
-          </p:cNvPr>
-          <p:cNvSpPr>
-            <a:spLocks noGrp="1"/>
-          </p:cNvSpPr>
-          <p:nvPr>
-            <p:ph type="title"/>
-          </p:nvPr>
-        </p:nvSpPr>
-        <p:spPr/>
+                <a16:creationId xmlns:a16="http://schemas.microsoft.com/office/drawing/2014/main" id="{7868F522-8A3A-4E22-A26D-5656E0C8F57C}"/>
+              </a:ext>
+            </a:extLst>
+          </p:cNvPr>
+          <p:cNvSpPr txBox="1">
+            <a:spLocks/>
+          </p:cNvSpPr>
+          <p:nvPr/>
+        </p:nvSpPr>
+        <p:spPr>
+          <a:xfrm>
+            <a:off x="838200" y="681037"/>
+            <a:ext cx="10515600" cy="1009651"/>
+          </a:xfrm>
+          <a:prstGeom prst="rect">
+            <a:avLst/>
+          </a:prstGeom>
+        </p:spPr>
         <p:txBody>
           <a:bodyPr>
             <a:normAutofit/>
           </a:bodyPr>
-          <a:lstStyle/>
+          <a:lstStyle>
+            <a:lvl1pPr algn="l" defTabSz="914400" rtl="0" eaLnBrk="1" latinLnBrk="0" hangingPunct="1">
+              <a:lnSpc>
+                <a:spcPct val="90000"/>
+              </a:lnSpc>
+              <a:spcBef>
+                <a:spcPct val="0"/>
+              </a:spcBef>
+              <a:buNone/>
+              <a:defRPr sz="4400" kern="1200">
+                <a:solidFill>
+                  <a:schemeClr val="tx1"/>
+                </a:solidFill>
+                <a:latin typeface="+mj-lt"/>
+                <a:ea typeface="+mj-ea"/>
+                <a:cs typeface="+mj-cs"/>
+              </a:defRPr>
+            </a:lvl1pPr>
+          </a:lstStyle>
           <a:p>
             <a:r>
               <a:rPr lang="en-CA" sz="3600" dirty="0">
@@ -4418,7 +4576,7 @@
                 <a:latin typeface="Arial" panose="020B0604020202020204" pitchFamily="34" charset="0"/>
                 <a:cs typeface="Arial" panose="020B0604020202020204" pitchFamily="34" charset="0"/>
               </a:rPr>
-              <a:t>File chaos</a:t>
+              <a:t>Overview</a:t>
             </a:r>
           </a:p>
         </p:txBody>
@@ -4428,30 +4586,199 @@
           <p:cNvPr id="3" name="Content Placeholder 2">
             <a:extLst>
               <a:ext uri="{FF2B5EF4-FFF2-40B4-BE49-F238E27FC236}">
-                <a16:creationId xmlns:a16="http://schemas.microsoft.com/office/drawing/2014/main" id="{199AD3BA-A31A-452F-99C1-8A631BB832C9}"/>
-              </a:ext>
-            </a:extLst>
-          </p:cNvPr>
-          <p:cNvSpPr>
-            <a:spLocks noGrp="1"/>
-          </p:cNvSpPr>
-          <p:nvPr>
-            <p:ph idx="1"/>
-          </p:nvPr>
-        </p:nvSpPr>
-        <p:spPr/>
+                <a16:creationId xmlns:a16="http://schemas.microsoft.com/office/drawing/2014/main" id="{1F888435-5355-4836-A6E6-3321E3BAC137}"/>
+              </a:ext>
+            </a:extLst>
+          </p:cNvPr>
+          <p:cNvSpPr txBox="1">
+            <a:spLocks/>
+          </p:cNvSpPr>
+          <p:nvPr/>
+        </p:nvSpPr>
+        <p:spPr>
+          <a:xfrm>
+            <a:off x="838200" y="1825625"/>
+            <a:ext cx="10515600" cy="4351338"/>
+          </a:xfrm>
+          <a:prstGeom prst="rect">
+            <a:avLst/>
+          </a:prstGeom>
+        </p:spPr>
         <p:txBody>
           <a:bodyPr>
             <a:normAutofit/>
           </a:bodyPr>
-          <a:lstStyle/>
+          <a:lstStyle>
+            <a:lvl1pPr marL="228600" indent="-228600" algn="l" defTabSz="914400" rtl="0" eaLnBrk="1" latinLnBrk="0" hangingPunct="1">
+              <a:lnSpc>
+                <a:spcPct val="90000"/>
+              </a:lnSpc>
+              <a:spcBef>
+                <a:spcPts val="1000"/>
+              </a:spcBef>
+              <a:buFont typeface="Arial" panose="020B0604020202020204" pitchFamily="34" charset="0"/>
+              <a:buChar char="•"/>
+              <a:defRPr sz="2800" kern="1200">
+                <a:solidFill>
+                  <a:schemeClr val="tx1"/>
+                </a:solidFill>
+                <a:latin typeface="+mn-lt"/>
+                <a:ea typeface="+mn-ea"/>
+                <a:cs typeface="+mn-cs"/>
+              </a:defRPr>
+            </a:lvl1pPr>
+            <a:lvl2pPr marL="685800" indent="-228600" algn="l" defTabSz="914400" rtl="0" eaLnBrk="1" latinLnBrk="0" hangingPunct="1">
+              <a:lnSpc>
+                <a:spcPct val="90000"/>
+              </a:lnSpc>
+              <a:spcBef>
+                <a:spcPts val="500"/>
+              </a:spcBef>
+              <a:buFont typeface="Arial" panose="020B0604020202020204" pitchFamily="34" charset="0"/>
+              <a:buChar char="•"/>
+              <a:defRPr sz="2400" kern="1200">
+                <a:solidFill>
+                  <a:schemeClr val="tx1"/>
+                </a:solidFill>
+                <a:latin typeface="+mn-lt"/>
+                <a:ea typeface="+mn-ea"/>
+                <a:cs typeface="+mn-cs"/>
+              </a:defRPr>
+            </a:lvl2pPr>
+            <a:lvl3pPr marL="1143000" indent="-228600" algn="l" defTabSz="914400" rtl="0" eaLnBrk="1" latinLnBrk="0" hangingPunct="1">
+              <a:lnSpc>
+                <a:spcPct val="90000"/>
+              </a:lnSpc>
+              <a:spcBef>
+                <a:spcPts val="500"/>
+              </a:spcBef>
+              <a:buFont typeface="Arial" panose="020B0604020202020204" pitchFamily="34" charset="0"/>
+              <a:buChar char="•"/>
+              <a:defRPr sz="2000" kern="1200">
+                <a:solidFill>
+                  <a:schemeClr val="tx1"/>
+                </a:solidFill>
+                <a:latin typeface="+mn-lt"/>
+                <a:ea typeface="+mn-ea"/>
+                <a:cs typeface="+mn-cs"/>
+              </a:defRPr>
+            </a:lvl3pPr>
+            <a:lvl4pPr marL="1600200" indent="-228600" algn="l" defTabSz="914400" rtl="0" eaLnBrk="1" latinLnBrk="0" hangingPunct="1">
+              <a:lnSpc>
+                <a:spcPct val="90000"/>
+              </a:lnSpc>
+              <a:spcBef>
+                <a:spcPts val="500"/>
+              </a:spcBef>
+              <a:buFont typeface="Arial" panose="020B0604020202020204" pitchFamily="34" charset="0"/>
+              <a:buChar char="•"/>
+              <a:defRPr sz="1800" kern="1200">
+                <a:solidFill>
+                  <a:schemeClr val="tx1"/>
+                </a:solidFill>
+                <a:latin typeface="+mn-lt"/>
+                <a:ea typeface="+mn-ea"/>
+                <a:cs typeface="+mn-cs"/>
+              </a:defRPr>
+            </a:lvl4pPr>
+            <a:lvl5pPr marL="2057400" indent="-228600" algn="l" defTabSz="914400" rtl="0" eaLnBrk="1" latinLnBrk="0" hangingPunct="1">
+              <a:lnSpc>
+                <a:spcPct val="90000"/>
+              </a:lnSpc>
+              <a:spcBef>
+                <a:spcPts val="500"/>
+              </a:spcBef>
+              <a:buFont typeface="Arial" panose="020B0604020202020204" pitchFamily="34" charset="0"/>
+              <a:buChar char="•"/>
+              <a:defRPr sz="1800" kern="1200">
+                <a:solidFill>
+                  <a:schemeClr val="tx1"/>
+                </a:solidFill>
+                <a:latin typeface="+mn-lt"/>
+                <a:ea typeface="+mn-ea"/>
+                <a:cs typeface="+mn-cs"/>
+              </a:defRPr>
+            </a:lvl5pPr>
+            <a:lvl6pPr marL="2514600" indent="-228600" algn="l" defTabSz="914400" rtl="0" eaLnBrk="1" latinLnBrk="0" hangingPunct="1">
+              <a:lnSpc>
+                <a:spcPct val="90000"/>
+              </a:lnSpc>
+              <a:spcBef>
+                <a:spcPts val="500"/>
+              </a:spcBef>
+              <a:buFont typeface="Arial" panose="020B0604020202020204" pitchFamily="34" charset="0"/>
+              <a:buChar char="•"/>
+              <a:defRPr sz="1800" kern="1200">
+                <a:solidFill>
+                  <a:schemeClr val="tx1"/>
+                </a:solidFill>
+                <a:latin typeface="+mn-lt"/>
+                <a:ea typeface="+mn-ea"/>
+                <a:cs typeface="+mn-cs"/>
+              </a:defRPr>
+            </a:lvl6pPr>
+            <a:lvl7pPr marL="2971800" indent="-228600" algn="l" defTabSz="914400" rtl="0" eaLnBrk="1" latinLnBrk="0" hangingPunct="1">
+              <a:lnSpc>
+                <a:spcPct val="90000"/>
+              </a:lnSpc>
+              <a:spcBef>
+                <a:spcPts val="500"/>
+              </a:spcBef>
+              <a:buFont typeface="Arial" panose="020B0604020202020204" pitchFamily="34" charset="0"/>
+              <a:buChar char="•"/>
+              <a:defRPr sz="1800" kern="1200">
+                <a:solidFill>
+                  <a:schemeClr val="tx1"/>
+                </a:solidFill>
+                <a:latin typeface="+mn-lt"/>
+                <a:ea typeface="+mn-ea"/>
+                <a:cs typeface="+mn-cs"/>
+              </a:defRPr>
+            </a:lvl7pPr>
+            <a:lvl8pPr marL="3429000" indent="-228600" algn="l" defTabSz="914400" rtl="0" eaLnBrk="1" latinLnBrk="0" hangingPunct="1">
+              <a:lnSpc>
+                <a:spcPct val="90000"/>
+              </a:lnSpc>
+              <a:spcBef>
+                <a:spcPts val="500"/>
+              </a:spcBef>
+              <a:buFont typeface="Arial" panose="020B0604020202020204" pitchFamily="34" charset="0"/>
+              <a:buChar char="•"/>
+              <a:defRPr sz="1800" kern="1200">
+                <a:solidFill>
+                  <a:schemeClr val="tx1"/>
+                </a:solidFill>
+                <a:latin typeface="+mn-lt"/>
+                <a:ea typeface="+mn-ea"/>
+                <a:cs typeface="+mn-cs"/>
+              </a:defRPr>
+            </a:lvl8pPr>
+            <a:lvl9pPr marL="3886200" indent="-228600" algn="l" defTabSz="914400" rtl="0" eaLnBrk="1" latinLnBrk="0" hangingPunct="1">
+              <a:lnSpc>
+                <a:spcPct val="90000"/>
+              </a:lnSpc>
+              <a:spcBef>
+                <a:spcPts val="500"/>
+              </a:spcBef>
+              <a:buFont typeface="Arial" panose="020B0604020202020204" pitchFamily="34" charset="0"/>
+              <a:buChar char="•"/>
+              <a:defRPr sz="1800" kern="1200">
+                <a:solidFill>
+                  <a:schemeClr val="tx1"/>
+                </a:solidFill>
+                <a:latin typeface="+mn-lt"/>
+                <a:ea typeface="+mn-ea"/>
+                <a:cs typeface="+mn-cs"/>
+              </a:defRPr>
+            </a:lvl9pPr>
+          </a:lstStyle>
           <a:p>
             <a:r>
               <a:rPr lang="en-CA" dirty="0">
                 <a:latin typeface="Arial" panose="020B0604020202020204" pitchFamily="34" charset="0"/>
                 <a:cs typeface="Arial" panose="020B0604020202020204" pitchFamily="34" charset="0"/>
               </a:rPr>
-              <a:t>How much time do you spend looking for files saved on your computer?</a:t>
+              <a:t>Project folder structure (projects directory with individual project subdirectories)</a:t>
             </a:r>
           </a:p>
           <a:p>
@@ -4460,7 +4787,7 @@
                 <a:latin typeface="Arial" panose="020B0604020202020204" pitchFamily="34" charset="0"/>
                 <a:cs typeface="Arial" panose="020B0604020202020204" pitchFamily="34" charset="0"/>
               </a:rPr>
-              <a:t>Once you’ve managed to find the file, are you faced with multiple files named for incremental versions?</a:t>
+              <a:t>File naming</a:t>
             </a:r>
           </a:p>
           <a:p>
@@ -4469,35 +4796,25 @@
                 <a:latin typeface="Arial" panose="020B0604020202020204" pitchFamily="34" charset="0"/>
                 <a:cs typeface="Arial" panose="020B0604020202020204" pitchFamily="34" charset="0"/>
               </a:rPr>
-              <a:t>Do you choose between “</a:t>
-            </a:r>
-            <a:r>
-              <a:rPr lang="en-CA" dirty="0" err="1">
-                <a:latin typeface="Arial" panose="020B0604020202020204" pitchFamily="34" charset="0"/>
-                <a:cs typeface="Arial" panose="020B0604020202020204" pitchFamily="34" charset="0"/>
-              </a:rPr>
-              <a:t>FILE_final</a:t>
-            </a:r>
+              <a:t>Set up version control</a:t>
+            </a:r>
+          </a:p>
+          <a:p>
             <a:r>
               <a:rPr lang="en-CA" dirty="0">
                 <a:latin typeface="Arial" panose="020B0604020202020204" pitchFamily="34" charset="0"/>
                 <a:cs typeface="Arial" panose="020B0604020202020204" pitchFamily="34" charset="0"/>
               </a:rPr>
-              <a:t>” and “</a:t>
-            </a:r>
-            <a:r>
-              <a:rPr lang="en-CA" dirty="0" err="1">
-                <a:latin typeface="Arial" panose="020B0604020202020204" pitchFamily="34" charset="0"/>
-                <a:cs typeface="Arial" panose="020B0604020202020204" pitchFamily="34" charset="0"/>
-              </a:rPr>
-              <a:t>FILE_best_version</a:t>
-            </a:r>
+              <a:t>READMEs</a:t>
+            </a:r>
+          </a:p>
+          <a:p>
             <a:r>
               <a:rPr lang="en-CA" dirty="0">
                 <a:latin typeface="Arial" panose="020B0604020202020204" pitchFamily="34" charset="0"/>
                 <a:cs typeface="Arial" panose="020B0604020202020204" pitchFamily="34" charset="0"/>
               </a:rPr>
-              <a:t>” by opening up a dozen files?</a:t>
+              <a:t>Licenses</a:t>
             </a:r>
           </a:p>
           <a:p>
@@ -4506,7 +4823,16 @@
                 <a:latin typeface="Arial" panose="020B0604020202020204" pitchFamily="34" charset="0"/>
                 <a:cs typeface="Arial" panose="020B0604020202020204" pitchFamily="34" charset="0"/>
               </a:rPr>
-              <a:t>Do deadlines or laziness exacerbate saving files on your Desktop (with the best intention of “organizing it later?”</a:t>
+              <a:t>DOI for code</a:t>
+            </a:r>
+          </a:p>
+          <a:p>
+            <a:r>
+              <a:rPr lang="en-CA" dirty="0">
+                <a:latin typeface="Arial" panose="020B0604020202020204" pitchFamily="34" charset="0"/>
+                <a:cs typeface="Arial" panose="020B0604020202020204" pitchFamily="34" charset="0"/>
+              </a:rPr>
+              <a:t>Good practice, conventions</a:t>
             </a:r>
           </a:p>
         </p:txBody>
@@ -4514,7 +4840,7 @@
     </p:spTree>
     <p:extLst>
       <p:ext uri="{BB962C8B-B14F-4D97-AF65-F5344CB8AC3E}">
-        <p14:creationId xmlns:p14="http://schemas.microsoft.com/office/powerpoint/2010/main" val="3157605048"/>
+        <p14:creationId xmlns:p14="http://schemas.microsoft.com/office/powerpoint/2010/main" val="424032669"/>
       </p:ext>
     </p:extLst>
   </p:cSld>
@@ -4566,10 +4892,13 @@
           <a:p>
             <a:r>
               <a:rPr lang="en-CA" sz="3600" dirty="0">
+                <a:solidFill>
+                  <a:srgbClr val="FF0000"/>
+                </a:solidFill>
                 <a:latin typeface="Arial" panose="020B0604020202020204" pitchFamily="34" charset="0"/>
                 <a:cs typeface="Arial" panose="020B0604020202020204" pitchFamily="34" charset="0"/>
               </a:rPr>
-              <a:t>Solution: Create an organized folder structure</a:t>
+              <a:t>File chaos</a:t>
             </a:r>
           </a:p>
         </p:txBody>
@@ -4592,7 +4921,9 @@
         </p:nvSpPr>
         <p:spPr/>
         <p:txBody>
-          <a:bodyPr/>
+          <a:bodyPr>
+            <a:normAutofit/>
+          </a:bodyPr>
           <a:lstStyle/>
           <a:p>
             <a:r>
@@ -4600,7 +4931,7 @@
                 <a:latin typeface="Arial" panose="020B0604020202020204" pitchFamily="34" charset="0"/>
                 <a:cs typeface="Arial" panose="020B0604020202020204" pitchFamily="34" charset="0"/>
               </a:rPr>
-              <a:t>Have a projects directory</a:t>
+              <a:t>How much time do you spend looking for files saved on your computer?</a:t>
             </a:r>
           </a:p>
           <a:p>
@@ -4609,7 +4940,7 @@
                 <a:latin typeface="Arial" panose="020B0604020202020204" pitchFamily="34" charset="0"/>
                 <a:cs typeface="Arial" panose="020B0604020202020204" pitchFamily="34" charset="0"/>
               </a:rPr>
-              <a:t>Every project has its own directory (folder)</a:t>
+              <a:t>Once you’ve managed to find the file, are you faced with multiple files named for incremental versions?</a:t>
             </a:r>
           </a:p>
           <a:p>
@@ -4618,16 +4949,44 @@
                 <a:latin typeface="Arial" panose="020B0604020202020204" pitchFamily="34" charset="0"/>
                 <a:cs typeface="Arial" panose="020B0604020202020204" pitchFamily="34" charset="0"/>
               </a:rPr>
-              <a:t>Subdirectories (subfolders) are named with keywords (e.g. data, output, scripts, figures)</a:t>
-            </a:r>
-          </a:p>
-          <a:p>
+              <a:t>Do you choose between “</a:t>
+            </a:r>
+            <a:r>
+              <a:rPr lang="en-CA" dirty="0" err="1">
+                <a:latin typeface="Arial" panose="020B0604020202020204" pitchFamily="34" charset="0"/>
+                <a:cs typeface="Arial" panose="020B0604020202020204" pitchFamily="34" charset="0"/>
+              </a:rPr>
+              <a:t>FILE_final</a:t>
+            </a:r>
             <a:r>
               <a:rPr lang="en-CA" dirty="0">
                 <a:latin typeface="Arial" panose="020B0604020202020204" pitchFamily="34" charset="0"/>
                 <a:cs typeface="Arial" panose="020B0604020202020204" pitchFamily="34" charset="0"/>
               </a:rPr>
-              <a:t>Be consistent across project folder structures because to make things easy on yourself</a:t>
+              <a:t>” and “</a:t>
+            </a:r>
+            <a:r>
+              <a:rPr lang="en-CA" dirty="0" err="1">
+                <a:latin typeface="Arial" panose="020B0604020202020204" pitchFamily="34" charset="0"/>
+                <a:cs typeface="Arial" panose="020B0604020202020204" pitchFamily="34" charset="0"/>
+              </a:rPr>
+              <a:t>FILE_best_version</a:t>
+            </a:r>
+            <a:r>
+              <a:rPr lang="en-CA" dirty="0">
+                <a:latin typeface="Arial" panose="020B0604020202020204" pitchFamily="34" charset="0"/>
+                <a:cs typeface="Arial" panose="020B0604020202020204" pitchFamily="34" charset="0"/>
+              </a:rPr>
+              <a:t>” by opening up a dozen files?</a:t>
+            </a:r>
+          </a:p>
+          <a:p>
+            <a:r>
+              <a:rPr lang="en-CA" dirty="0">
+                <a:latin typeface="Arial" panose="020B0604020202020204" pitchFamily="34" charset="0"/>
+                <a:cs typeface="Arial" panose="020B0604020202020204" pitchFamily="34" charset="0"/>
+              </a:rPr>
+              <a:t>Do deadlines or laziness exacerbate saving files on your Desktop (with the best intention of “organizing it later?”</a:t>
             </a:r>
           </a:p>
         </p:txBody>
@@ -4635,7 +4994,7 @@
     </p:spTree>
     <p:extLst>
       <p:ext uri="{BB962C8B-B14F-4D97-AF65-F5344CB8AC3E}">
-        <p14:creationId xmlns:p14="http://schemas.microsoft.com/office/powerpoint/2010/main" val="2602763021"/>
+        <p14:creationId xmlns:p14="http://schemas.microsoft.com/office/powerpoint/2010/main" val="3157605048"/>
       </p:ext>
     </p:extLst>
   </p:cSld>
@@ -4690,7 +5049,7 @@
                 <a:latin typeface="Arial" panose="020B0604020202020204" pitchFamily="34" charset="0"/>
                 <a:cs typeface="Arial" panose="020B0604020202020204" pitchFamily="34" charset="0"/>
               </a:rPr>
-              <a:t>Track file versions</a:t>
+              <a:t>Solution: Create an organized folder structure</a:t>
             </a:r>
           </a:p>
         </p:txBody>
@@ -4721,7 +5080,7 @@
                 <a:latin typeface="Arial" panose="020B0604020202020204" pitchFamily="34" charset="0"/>
                 <a:cs typeface="Arial" panose="020B0604020202020204" pitchFamily="34" charset="0"/>
               </a:rPr>
-              <a:t>“_v1”, “_v2,”, “_v12”, “_final”, “_final2” – where does it end?!</a:t>
+              <a:t>Have a projects directory</a:t>
             </a:r>
           </a:p>
           <a:p>
@@ -4730,37 +5089,25 @@
                 <a:latin typeface="Arial" panose="020B0604020202020204" pitchFamily="34" charset="0"/>
                 <a:cs typeface="Arial" panose="020B0604020202020204" pitchFamily="34" charset="0"/>
               </a:rPr>
-              <a:t>It ends with a file versioning system.</a:t>
-            </a:r>
-          </a:p>
-          <a:p>
-            <a:pPr lvl="1"/>
+              <a:t>Every project has its own directory (folder)</a:t>
+            </a:r>
+          </a:p>
+          <a:p>
             <a:r>
               <a:rPr lang="en-CA" dirty="0">
                 <a:latin typeface="Arial" panose="020B0604020202020204" pitchFamily="34" charset="0"/>
                 <a:cs typeface="Arial" panose="020B0604020202020204" pitchFamily="34" charset="0"/>
               </a:rPr>
-              <a:t>One file with a consistent file name</a:t>
-            </a:r>
-          </a:p>
-          <a:p>
-            <a:pPr lvl="1"/>
+              <a:t>Subdirectories (subfolders) are named with keywords (e.g. data, output, scripts, figures)</a:t>
+            </a:r>
+          </a:p>
+          <a:p>
             <a:r>
               <a:rPr lang="en-CA" dirty="0">
                 <a:latin typeface="Arial" panose="020B0604020202020204" pitchFamily="34" charset="0"/>
                 <a:cs typeface="Arial" panose="020B0604020202020204" pitchFamily="34" charset="0"/>
               </a:rPr>
-              <a:t>Modifications to the file are tracked by the versioning system</a:t>
-            </a:r>
-          </a:p>
-          <a:p>
-            <a:pPr lvl="1"/>
-            <a:r>
-              <a:rPr lang="en-CA" dirty="0">
-                <a:latin typeface="Arial" panose="020B0604020202020204" pitchFamily="34" charset="0"/>
-                <a:cs typeface="Arial" panose="020B0604020202020204" pitchFamily="34" charset="0"/>
-              </a:rPr>
-              <a:t>Earlier incarnations of the file are accessible if you decide you need to revert to an earlier version</a:t>
+              <a:t>Be consistent across project folder structures because to make things easy on yourself</a:t>
             </a:r>
           </a:p>
         </p:txBody>
@@ -4768,7 +5115,7 @@
     </p:spTree>
     <p:extLst>
       <p:ext uri="{BB962C8B-B14F-4D97-AF65-F5344CB8AC3E}">
-        <p14:creationId xmlns:p14="http://schemas.microsoft.com/office/powerpoint/2010/main" val="1877003925"/>
+        <p14:creationId xmlns:p14="http://schemas.microsoft.com/office/powerpoint/2010/main" val="2602763021"/>
       </p:ext>
     </p:extLst>
   </p:cSld>

</xml_diff>

<commit_message>
Added file chaos solution slides
</commit_message>
<xml_diff>
--- a/presentation_part2.pptx
+++ b/presentation_part2.pptx
@@ -4,6 +4,9 @@
   <p:sldMasterIdLst>
     <p:sldMasterId id="2147483648" r:id="rId1"/>
   </p:sldMasterIdLst>
+  <p:notesMasterIdLst>
+    <p:notesMasterId r:id="rId11"/>
+  </p:notesMasterIdLst>
   <p:sldIdLst>
     <p:sldId id="256" r:id="rId2"/>
     <p:sldId id="258" r:id="rId3"/>
@@ -11,10 +14,9 @@
     <p:sldId id="260" r:id="rId5"/>
     <p:sldId id="259" r:id="rId6"/>
     <p:sldId id="261" r:id="rId7"/>
-    <p:sldId id="265" r:id="rId8"/>
-    <p:sldId id="262" r:id="rId9"/>
-    <p:sldId id="263" r:id="rId10"/>
-    <p:sldId id="264" r:id="rId11"/>
+    <p:sldId id="266" r:id="rId8"/>
+    <p:sldId id="267" r:id="rId9"/>
+    <p:sldId id="265" r:id="rId10"/>
   </p:sldIdLst>
   <p:sldSz cx="12192000" cy="6858000"/>
   <p:notesSz cx="6858000" cy="9144000"/>
@@ -121,6 +123,731 @@
 </p:presentation>
 </file>
 
+<file path=ppt/notesMasters/notesMaster1.xml><?xml version="1.0" encoding="utf-8"?>
+<p:notesMaster xmlns:a="http://schemas.openxmlformats.org/drawingml/2006/main" xmlns:r="http://schemas.openxmlformats.org/officeDocument/2006/relationships" xmlns:p="http://schemas.openxmlformats.org/presentationml/2006/main">
+  <p:cSld>
+    <p:bg>
+      <p:bgRef idx="1001">
+        <a:schemeClr val="bg1"/>
+      </p:bgRef>
+    </p:bg>
+    <p:spTree>
+      <p:nvGrpSpPr>
+        <p:cNvPr id="1" name=""/>
+        <p:cNvGrpSpPr/>
+        <p:nvPr/>
+      </p:nvGrpSpPr>
+      <p:grpSpPr>
+        <a:xfrm>
+          <a:off x="0" y="0"/>
+          <a:ext cx="0" cy="0"/>
+          <a:chOff x="0" y="0"/>
+          <a:chExt cx="0" cy="0"/>
+        </a:xfrm>
+      </p:grpSpPr>
+      <p:sp>
+        <p:nvSpPr>
+          <p:cNvPr id="2" name="Header Placeholder 1"/>
+          <p:cNvSpPr>
+            <a:spLocks noGrp="1"/>
+          </p:cNvSpPr>
+          <p:nvPr>
+            <p:ph type="hdr" sz="quarter"/>
+          </p:nvPr>
+        </p:nvSpPr>
+        <p:spPr>
+          <a:xfrm>
+            <a:off x="0" y="0"/>
+            <a:ext cx="2971800" cy="458788"/>
+          </a:xfrm>
+          <a:prstGeom prst="rect">
+            <a:avLst/>
+          </a:prstGeom>
+        </p:spPr>
+        <p:txBody>
+          <a:bodyPr vert="horz" lIns="91440" tIns="45720" rIns="91440" bIns="45720" rtlCol="0"/>
+          <a:lstStyle>
+            <a:lvl1pPr algn="l">
+              <a:defRPr sz="1200"/>
+            </a:lvl1pPr>
+          </a:lstStyle>
+          <a:p>
+            <a:endParaRPr lang="en-CA"/>
+          </a:p>
+        </p:txBody>
+      </p:sp>
+      <p:sp>
+        <p:nvSpPr>
+          <p:cNvPr id="3" name="Date Placeholder 2"/>
+          <p:cNvSpPr>
+            <a:spLocks noGrp="1"/>
+          </p:cNvSpPr>
+          <p:nvPr>
+            <p:ph type="dt" idx="1"/>
+          </p:nvPr>
+        </p:nvSpPr>
+        <p:spPr>
+          <a:xfrm>
+            <a:off x="3884613" y="0"/>
+            <a:ext cx="2971800" cy="458788"/>
+          </a:xfrm>
+          <a:prstGeom prst="rect">
+            <a:avLst/>
+          </a:prstGeom>
+        </p:spPr>
+        <p:txBody>
+          <a:bodyPr vert="horz" lIns="91440" tIns="45720" rIns="91440" bIns="45720" rtlCol="0"/>
+          <a:lstStyle>
+            <a:lvl1pPr algn="r">
+              <a:defRPr sz="1200"/>
+            </a:lvl1pPr>
+          </a:lstStyle>
+          <a:p>
+            <a:fld id="{26372E23-CA99-4283-AAC6-F001C5DD622B}" type="datetimeFigureOut">
+              <a:rPr lang="en-CA" smtClean="0"/>
+              <a:t>2019-11-01</a:t>
+            </a:fld>
+            <a:endParaRPr lang="en-CA"/>
+          </a:p>
+        </p:txBody>
+      </p:sp>
+      <p:sp>
+        <p:nvSpPr>
+          <p:cNvPr id="4" name="Slide Image Placeholder 3"/>
+          <p:cNvSpPr>
+            <a:spLocks noGrp="1" noRot="1" noChangeAspect="1"/>
+          </p:cNvSpPr>
+          <p:nvPr>
+            <p:ph type="sldImg" idx="2"/>
+          </p:nvPr>
+        </p:nvSpPr>
+        <p:spPr>
+          <a:xfrm>
+            <a:off x="685800" y="1143000"/>
+            <a:ext cx="5486400" cy="3086100"/>
+          </a:xfrm>
+          <a:prstGeom prst="rect">
+            <a:avLst/>
+          </a:prstGeom>
+          <a:noFill/>
+          <a:ln w="12700">
+            <a:solidFill>
+              <a:prstClr val="black"/>
+            </a:solidFill>
+          </a:ln>
+        </p:spPr>
+        <p:txBody>
+          <a:bodyPr vert="horz" lIns="91440" tIns="45720" rIns="91440" bIns="45720" rtlCol="0" anchor="ctr"/>
+          <a:lstStyle/>
+          <a:p>
+            <a:endParaRPr lang="en-CA"/>
+          </a:p>
+        </p:txBody>
+      </p:sp>
+      <p:sp>
+        <p:nvSpPr>
+          <p:cNvPr id="5" name="Notes Placeholder 4"/>
+          <p:cNvSpPr>
+            <a:spLocks noGrp="1"/>
+          </p:cNvSpPr>
+          <p:nvPr>
+            <p:ph type="body" sz="quarter" idx="3"/>
+          </p:nvPr>
+        </p:nvSpPr>
+        <p:spPr>
+          <a:xfrm>
+            <a:off x="685800" y="4400550"/>
+            <a:ext cx="5486400" cy="3600450"/>
+          </a:xfrm>
+          <a:prstGeom prst="rect">
+            <a:avLst/>
+          </a:prstGeom>
+        </p:spPr>
+        <p:txBody>
+          <a:bodyPr vert="horz" lIns="91440" tIns="45720" rIns="91440" bIns="45720" rtlCol="0"/>
+          <a:lstStyle/>
+          <a:p>
+            <a:pPr lvl="0"/>
+            <a:r>
+              <a:rPr lang="en-US"/>
+              <a:t>Click to edit Master text styles</a:t>
+            </a:r>
+          </a:p>
+          <a:p>
+            <a:pPr lvl="1"/>
+            <a:r>
+              <a:rPr lang="en-US"/>
+              <a:t>Second level</a:t>
+            </a:r>
+          </a:p>
+          <a:p>
+            <a:pPr lvl="2"/>
+            <a:r>
+              <a:rPr lang="en-US"/>
+              <a:t>Third level</a:t>
+            </a:r>
+          </a:p>
+          <a:p>
+            <a:pPr lvl="3"/>
+            <a:r>
+              <a:rPr lang="en-US"/>
+              <a:t>Fourth level</a:t>
+            </a:r>
+          </a:p>
+          <a:p>
+            <a:pPr lvl="4"/>
+            <a:r>
+              <a:rPr lang="en-US"/>
+              <a:t>Fifth level</a:t>
+            </a:r>
+            <a:endParaRPr lang="en-CA"/>
+          </a:p>
+        </p:txBody>
+      </p:sp>
+      <p:sp>
+        <p:nvSpPr>
+          <p:cNvPr id="6" name="Footer Placeholder 5"/>
+          <p:cNvSpPr>
+            <a:spLocks noGrp="1"/>
+          </p:cNvSpPr>
+          <p:nvPr>
+            <p:ph type="ftr" sz="quarter" idx="4"/>
+          </p:nvPr>
+        </p:nvSpPr>
+        <p:spPr>
+          <a:xfrm>
+            <a:off x="0" y="8685213"/>
+            <a:ext cx="2971800" cy="458787"/>
+          </a:xfrm>
+          <a:prstGeom prst="rect">
+            <a:avLst/>
+          </a:prstGeom>
+        </p:spPr>
+        <p:txBody>
+          <a:bodyPr vert="horz" lIns="91440" tIns="45720" rIns="91440" bIns="45720" rtlCol="0" anchor="b"/>
+          <a:lstStyle>
+            <a:lvl1pPr algn="l">
+              <a:defRPr sz="1200"/>
+            </a:lvl1pPr>
+          </a:lstStyle>
+          <a:p>
+            <a:endParaRPr lang="en-CA"/>
+          </a:p>
+        </p:txBody>
+      </p:sp>
+      <p:sp>
+        <p:nvSpPr>
+          <p:cNvPr id="7" name="Slide Number Placeholder 6"/>
+          <p:cNvSpPr>
+            <a:spLocks noGrp="1"/>
+          </p:cNvSpPr>
+          <p:nvPr>
+            <p:ph type="sldNum" sz="quarter" idx="5"/>
+          </p:nvPr>
+        </p:nvSpPr>
+        <p:spPr>
+          <a:xfrm>
+            <a:off x="3884613" y="8685213"/>
+            <a:ext cx="2971800" cy="458787"/>
+          </a:xfrm>
+          <a:prstGeom prst="rect">
+            <a:avLst/>
+          </a:prstGeom>
+        </p:spPr>
+        <p:txBody>
+          <a:bodyPr vert="horz" lIns="91440" tIns="45720" rIns="91440" bIns="45720" rtlCol="0" anchor="b"/>
+          <a:lstStyle>
+            <a:lvl1pPr algn="r">
+              <a:defRPr sz="1200"/>
+            </a:lvl1pPr>
+          </a:lstStyle>
+          <a:p>
+            <a:fld id="{BC8D36B5-FA4A-4112-AD12-101780DFA3F1}" type="slidenum">
+              <a:rPr lang="en-CA" smtClean="0"/>
+              <a:t>‹#›</a:t>
+            </a:fld>
+            <a:endParaRPr lang="en-CA"/>
+          </a:p>
+        </p:txBody>
+      </p:sp>
+    </p:spTree>
+    <p:extLst>
+      <p:ext uri="{BB962C8B-B14F-4D97-AF65-F5344CB8AC3E}">
+        <p14:creationId xmlns:p14="http://schemas.microsoft.com/office/powerpoint/2010/main" val="371823708"/>
+      </p:ext>
+    </p:extLst>
+  </p:cSld>
+  <p:clrMap bg1="lt1" tx1="dk1" bg2="lt2" tx2="dk2" accent1="accent1" accent2="accent2" accent3="accent3" accent4="accent4" accent5="accent5" accent6="accent6" hlink="hlink" folHlink="folHlink"/>
+  <p:notesStyle>
+    <a:lvl1pPr marL="0" algn="l" defTabSz="914400" rtl="0" eaLnBrk="1" latinLnBrk="0" hangingPunct="1">
+      <a:defRPr sz="1200" kern="1200">
+        <a:solidFill>
+          <a:schemeClr val="tx1"/>
+        </a:solidFill>
+        <a:latin typeface="+mn-lt"/>
+        <a:ea typeface="+mn-ea"/>
+        <a:cs typeface="+mn-cs"/>
+      </a:defRPr>
+    </a:lvl1pPr>
+    <a:lvl2pPr marL="457200" algn="l" defTabSz="914400" rtl="0" eaLnBrk="1" latinLnBrk="0" hangingPunct="1">
+      <a:defRPr sz="1200" kern="1200">
+        <a:solidFill>
+          <a:schemeClr val="tx1"/>
+        </a:solidFill>
+        <a:latin typeface="+mn-lt"/>
+        <a:ea typeface="+mn-ea"/>
+        <a:cs typeface="+mn-cs"/>
+      </a:defRPr>
+    </a:lvl2pPr>
+    <a:lvl3pPr marL="914400" algn="l" defTabSz="914400" rtl="0" eaLnBrk="1" latinLnBrk="0" hangingPunct="1">
+      <a:defRPr sz="1200" kern="1200">
+        <a:solidFill>
+          <a:schemeClr val="tx1"/>
+        </a:solidFill>
+        <a:latin typeface="+mn-lt"/>
+        <a:ea typeface="+mn-ea"/>
+        <a:cs typeface="+mn-cs"/>
+      </a:defRPr>
+    </a:lvl3pPr>
+    <a:lvl4pPr marL="1371600" algn="l" defTabSz="914400" rtl="0" eaLnBrk="1" latinLnBrk="0" hangingPunct="1">
+      <a:defRPr sz="1200" kern="1200">
+        <a:solidFill>
+          <a:schemeClr val="tx1"/>
+        </a:solidFill>
+        <a:latin typeface="+mn-lt"/>
+        <a:ea typeface="+mn-ea"/>
+        <a:cs typeface="+mn-cs"/>
+      </a:defRPr>
+    </a:lvl4pPr>
+    <a:lvl5pPr marL="1828800" algn="l" defTabSz="914400" rtl="0" eaLnBrk="1" latinLnBrk="0" hangingPunct="1">
+      <a:defRPr sz="1200" kern="1200">
+        <a:solidFill>
+          <a:schemeClr val="tx1"/>
+        </a:solidFill>
+        <a:latin typeface="+mn-lt"/>
+        <a:ea typeface="+mn-ea"/>
+        <a:cs typeface="+mn-cs"/>
+      </a:defRPr>
+    </a:lvl5pPr>
+    <a:lvl6pPr marL="2286000" algn="l" defTabSz="914400" rtl="0" eaLnBrk="1" latinLnBrk="0" hangingPunct="1">
+      <a:defRPr sz="1200" kern="1200">
+        <a:solidFill>
+          <a:schemeClr val="tx1"/>
+        </a:solidFill>
+        <a:latin typeface="+mn-lt"/>
+        <a:ea typeface="+mn-ea"/>
+        <a:cs typeface="+mn-cs"/>
+      </a:defRPr>
+    </a:lvl6pPr>
+    <a:lvl7pPr marL="2743200" algn="l" defTabSz="914400" rtl="0" eaLnBrk="1" latinLnBrk="0" hangingPunct="1">
+      <a:defRPr sz="1200" kern="1200">
+        <a:solidFill>
+          <a:schemeClr val="tx1"/>
+        </a:solidFill>
+        <a:latin typeface="+mn-lt"/>
+        <a:ea typeface="+mn-ea"/>
+        <a:cs typeface="+mn-cs"/>
+      </a:defRPr>
+    </a:lvl7pPr>
+    <a:lvl8pPr marL="3200400" algn="l" defTabSz="914400" rtl="0" eaLnBrk="1" latinLnBrk="0" hangingPunct="1">
+      <a:defRPr sz="1200" kern="1200">
+        <a:solidFill>
+          <a:schemeClr val="tx1"/>
+        </a:solidFill>
+        <a:latin typeface="+mn-lt"/>
+        <a:ea typeface="+mn-ea"/>
+        <a:cs typeface="+mn-cs"/>
+      </a:defRPr>
+    </a:lvl8pPr>
+    <a:lvl9pPr marL="3657600" algn="l" defTabSz="914400" rtl="0" eaLnBrk="1" latinLnBrk="0" hangingPunct="1">
+      <a:defRPr sz="1200" kern="1200">
+        <a:solidFill>
+          <a:schemeClr val="tx1"/>
+        </a:solidFill>
+        <a:latin typeface="+mn-lt"/>
+        <a:ea typeface="+mn-ea"/>
+        <a:cs typeface="+mn-cs"/>
+      </a:defRPr>
+    </a:lvl9pPr>
+  </p:notesStyle>
+</p:notesMaster>
+</file>
+
+<file path=ppt/notesSlides/notesSlide1.xml><?xml version="1.0" encoding="utf-8"?>
+<p:notes xmlns:a="http://schemas.openxmlformats.org/drawingml/2006/main" xmlns:r="http://schemas.openxmlformats.org/officeDocument/2006/relationships" xmlns:p="http://schemas.openxmlformats.org/presentationml/2006/main">
+  <p:cSld>
+    <p:spTree>
+      <p:nvGrpSpPr>
+        <p:cNvPr id="1" name=""/>
+        <p:cNvGrpSpPr/>
+        <p:nvPr/>
+      </p:nvGrpSpPr>
+      <p:grpSpPr>
+        <a:xfrm>
+          <a:off x="0" y="0"/>
+          <a:ext cx="0" cy="0"/>
+          <a:chOff x="0" y="0"/>
+          <a:chExt cx="0" cy="0"/>
+        </a:xfrm>
+      </p:grpSpPr>
+      <p:sp>
+        <p:nvSpPr>
+          <p:cNvPr id="2" name="Slide Image Placeholder 1"/>
+          <p:cNvSpPr>
+            <a:spLocks noGrp="1" noRot="1" noChangeAspect="1"/>
+          </p:cNvSpPr>
+          <p:nvPr>
+            <p:ph type="sldImg"/>
+          </p:nvPr>
+        </p:nvSpPr>
+        <p:spPr/>
+      </p:sp>
+      <p:sp>
+        <p:nvSpPr>
+          <p:cNvPr id="3" name="Notes Placeholder 2"/>
+          <p:cNvSpPr>
+            <a:spLocks noGrp="1"/>
+          </p:cNvSpPr>
+          <p:nvPr>
+            <p:ph type="body" idx="1"/>
+          </p:nvPr>
+        </p:nvSpPr>
+        <p:spPr/>
+        <p:txBody>
+          <a:bodyPr/>
+          <a:lstStyle/>
+          <a:p>
+            <a:pPr marL="0" marR="0" lvl="0" indent="0" algn="l" defTabSz="914400" rtl="0" eaLnBrk="1" fontAlgn="auto" latinLnBrk="0" hangingPunct="1">
+              <a:lnSpc>
+                <a:spcPct val="100000"/>
+              </a:lnSpc>
+              <a:spcBef>
+                <a:spcPts val="0"/>
+              </a:spcBef>
+              <a:spcAft>
+                <a:spcPts val="0"/>
+              </a:spcAft>
+              <a:buClrTx/>
+              <a:buSzTx/>
+              <a:buFontTx/>
+              <a:buNone/>
+              <a:tabLst/>
+              <a:defRPr/>
+            </a:pPr>
+            <a:r>
+              <a:rPr lang="en-CA" dirty="0">
+                <a:latin typeface="Arial" panose="020B0604020202020204" pitchFamily="34" charset="0"/>
+                <a:cs typeface="Arial" panose="020B0604020202020204" pitchFamily="34" charset="0"/>
+              </a:rPr>
+              <a:t>How much time do you spend looking for files saved on your computer?</a:t>
+            </a:r>
+          </a:p>
+        </p:txBody>
+      </p:sp>
+      <p:sp>
+        <p:nvSpPr>
+          <p:cNvPr id="4" name="Slide Number Placeholder 3"/>
+          <p:cNvSpPr>
+            <a:spLocks noGrp="1"/>
+          </p:cNvSpPr>
+          <p:nvPr>
+            <p:ph type="sldNum" sz="quarter" idx="5"/>
+          </p:nvPr>
+        </p:nvSpPr>
+        <p:spPr/>
+        <p:txBody>
+          <a:bodyPr/>
+          <a:lstStyle/>
+          <a:p>
+            <a:fld id="{BC8D36B5-FA4A-4112-AD12-101780DFA3F1}" type="slidenum">
+              <a:rPr lang="en-CA" smtClean="0"/>
+              <a:t>1</a:t>
+            </a:fld>
+            <a:endParaRPr lang="en-CA"/>
+          </a:p>
+        </p:txBody>
+      </p:sp>
+    </p:spTree>
+    <p:extLst>
+      <p:ext uri="{BB962C8B-B14F-4D97-AF65-F5344CB8AC3E}">
+        <p14:creationId xmlns:p14="http://schemas.microsoft.com/office/powerpoint/2010/main" val="1763239699"/>
+      </p:ext>
+    </p:extLst>
+  </p:cSld>
+  <p:clrMapOvr>
+    <a:masterClrMapping/>
+  </p:clrMapOvr>
+</p:notes>
+</file>
+
+<file path=ppt/notesSlides/notesSlide2.xml><?xml version="1.0" encoding="utf-8"?>
+<p:notes xmlns:a="http://schemas.openxmlformats.org/drawingml/2006/main" xmlns:r="http://schemas.openxmlformats.org/officeDocument/2006/relationships" xmlns:p="http://schemas.openxmlformats.org/presentationml/2006/main">
+  <p:cSld>
+    <p:spTree>
+      <p:nvGrpSpPr>
+        <p:cNvPr id="1" name=""/>
+        <p:cNvGrpSpPr/>
+        <p:nvPr/>
+      </p:nvGrpSpPr>
+      <p:grpSpPr>
+        <a:xfrm>
+          <a:off x="0" y="0"/>
+          <a:ext cx="0" cy="0"/>
+          <a:chOff x="0" y="0"/>
+          <a:chExt cx="0" cy="0"/>
+        </a:xfrm>
+      </p:grpSpPr>
+      <p:sp>
+        <p:nvSpPr>
+          <p:cNvPr id="2" name="Slide Image Placeholder 1"/>
+          <p:cNvSpPr>
+            <a:spLocks noGrp="1" noRot="1" noChangeAspect="1"/>
+          </p:cNvSpPr>
+          <p:nvPr>
+            <p:ph type="sldImg"/>
+          </p:nvPr>
+        </p:nvSpPr>
+        <p:spPr/>
+      </p:sp>
+      <p:sp>
+        <p:nvSpPr>
+          <p:cNvPr id="3" name="Notes Placeholder 2"/>
+          <p:cNvSpPr>
+            <a:spLocks noGrp="1"/>
+          </p:cNvSpPr>
+          <p:nvPr>
+            <p:ph type="body" idx="1"/>
+          </p:nvPr>
+        </p:nvSpPr>
+        <p:spPr/>
+        <p:txBody>
+          <a:bodyPr/>
+          <a:lstStyle/>
+          <a:p>
+            <a:pPr marL="0" marR="0" lvl="0" indent="0" algn="l" defTabSz="914400" rtl="0" eaLnBrk="1" fontAlgn="auto" latinLnBrk="0" hangingPunct="1">
+              <a:lnSpc>
+                <a:spcPct val="100000"/>
+              </a:lnSpc>
+              <a:spcBef>
+                <a:spcPts val="0"/>
+              </a:spcBef>
+              <a:spcAft>
+                <a:spcPts val="0"/>
+              </a:spcAft>
+              <a:buClrTx/>
+              <a:buSzTx/>
+              <a:buFontTx/>
+              <a:buNone/>
+              <a:tabLst/>
+              <a:defRPr/>
+            </a:pPr>
+            <a:r>
+              <a:rPr lang="en-CA" dirty="0">
+                <a:latin typeface="Arial" panose="020B0604020202020204" pitchFamily="34" charset="0"/>
+                <a:cs typeface="Arial" panose="020B0604020202020204" pitchFamily="34" charset="0"/>
+              </a:rPr>
+              <a:t>Do you choose between “</a:t>
+            </a:r>
+            <a:r>
+              <a:rPr lang="en-CA" dirty="0" err="1">
+                <a:latin typeface="Arial" panose="020B0604020202020204" pitchFamily="34" charset="0"/>
+                <a:cs typeface="Arial" panose="020B0604020202020204" pitchFamily="34" charset="0"/>
+              </a:rPr>
+              <a:t>FILE_final</a:t>
+            </a:r>
+            <a:r>
+              <a:rPr lang="en-CA" dirty="0">
+                <a:latin typeface="Arial" panose="020B0604020202020204" pitchFamily="34" charset="0"/>
+                <a:cs typeface="Arial" panose="020B0604020202020204" pitchFamily="34" charset="0"/>
+              </a:rPr>
+              <a:t>” and “</a:t>
+            </a:r>
+            <a:r>
+              <a:rPr lang="en-CA" dirty="0" err="1">
+                <a:latin typeface="Arial" panose="020B0604020202020204" pitchFamily="34" charset="0"/>
+                <a:cs typeface="Arial" panose="020B0604020202020204" pitchFamily="34" charset="0"/>
+              </a:rPr>
+              <a:t>FILE_best_version</a:t>
+            </a:r>
+            <a:r>
+              <a:rPr lang="en-CA" dirty="0">
+                <a:latin typeface="Arial" panose="020B0604020202020204" pitchFamily="34" charset="0"/>
+                <a:cs typeface="Arial" panose="020B0604020202020204" pitchFamily="34" charset="0"/>
+              </a:rPr>
+              <a:t>” by opening up a dozen files?</a:t>
+            </a:r>
+          </a:p>
+          <a:p>
+            <a:pPr marL="0" marR="0" lvl="0" indent="0" algn="l" defTabSz="914400" rtl="0" eaLnBrk="1" fontAlgn="auto" latinLnBrk="0" hangingPunct="1">
+              <a:lnSpc>
+                <a:spcPct val="100000"/>
+              </a:lnSpc>
+              <a:spcBef>
+                <a:spcPts val="0"/>
+              </a:spcBef>
+              <a:spcAft>
+                <a:spcPts val="0"/>
+              </a:spcAft>
+              <a:buClrTx/>
+              <a:buSzTx/>
+              <a:buFontTx/>
+              <a:buNone/>
+              <a:tabLst/>
+              <a:defRPr/>
+            </a:pPr>
+            <a:r>
+              <a:rPr lang="en-CA" dirty="0">
+                <a:latin typeface="Arial" panose="020B0604020202020204" pitchFamily="34" charset="0"/>
+                <a:cs typeface="Arial" panose="020B0604020202020204" pitchFamily="34" charset="0"/>
+              </a:rPr>
+              <a:t>Once you’ve managed to find the file, are you faced with multiple files named for incremental versions?</a:t>
+            </a:r>
+          </a:p>
+        </p:txBody>
+      </p:sp>
+      <p:sp>
+        <p:nvSpPr>
+          <p:cNvPr id="4" name="Slide Number Placeholder 3"/>
+          <p:cNvSpPr>
+            <a:spLocks noGrp="1"/>
+          </p:cNvSpPr>
+          <p:nvPr>
+            <p:ph type="sldNum" sz="quarter" idx="5"/>
+          </p:nvPr>
+        </p:nvSpPr>
+        <p:spPr/>
+        <p:txBody>
+          <a:bodyPr/>
+          <a:lstStyle/>
+          <a:p>
+            <a:fld id="{BC8D36B5-FA4A-4112-AD12-101780DFA3F1}" type="slidenum">
+              <a:rPr lang="en-CA" smtClean="0"/>
+              <a:t>3</a:t>
+            </a:fld>
+            <a:endParaRPr lang="en-CA"/>
+          </a:p>
+        </p:txBody>
+      </p:sp>
+    </p:spTree>
+    <p:extLst>
+      <p:ext uri="{BB962C8B-B14F-4D97-AF65-F5344CB8AC3E}">
+        <p14:creationId xmlns:p14="http://schemas.microsoft.com/office/powerpoint/2010/main" val="1494131152"/>
+      </p:ext>
+    </p:extLst>
+  </p:cSld>
+  <p:clrMapOvr>
+    <a:masterClrMapping/>
+  </p:clrMapOvr>
+</p:notes>
+</file>
+
+<file path=ppt/notesSlides/notesSlide3.xml><?xml version="1.0" encoding="utf-8"?>
+<p:notes xmlns:a="http://schemas.openxmlformats.org/drawingml/2006/main" xmlns:r="http://schemas.openxmlformats.org/officeDocument/2006/relationships" xmlns:p="http://schemas.openxmlformats.org/presentationml/2006/main">
+  <p:cSld>
+    <p:spTree>
+      <p:nvGrpSpPr>
+        <p:cNvPr id="1" name=""/>
+        <p:cNvGrpSpPr/>
+        <p:nvPr/>
+      </p:nvGrpSpPr>
+      <p:grpSpPr>
+        <a:xfrm>
+          <a:off x="0" y="0"/>
+          <a:ext cx="0" cy="0"/>
+          <a:chOff x="0" y="0"/>
+          <a:chExt cx="0" cy="0"/>
+        </a:xfrm>
+      </p:grpSpPr>
+      <p:sp>
+        <p:nvSpPr>
+          <p:cNvPr id="2" name="Slide Image Placeholder 1"/>
+          <p:cNvSpPr>
+            <a:spLocks noGrp="1" noRot="1" noChangeAspect="1"/>
+          </p:cNvSpPr>
+          <p:nvPr>
+            <p:ph type="sldImg"/>
+          </p:nvPr>
+        </p:nvSpPr>
+        <p:spPr/>
+      </p:sp>
+      <p:sp>
+        <p:nvSpPr>
+          <p:cNvPr id="3" name="Notes Placeholder 2"/>
+          <p:cNvSpPr>
+            <a:spLocks noGrp="1"/>
+          </p:cNvSpPr>
+          <p:nvPr>
+            <p:ph type="body" idx="1"/>
+          </p:nvPr>
+        </p:nvSpPr>
+        <p:spPr/>
+        <p:txBody>
+          <a:bodyPr/>
+          <a:lstStyle/>
+          <a:p>
+            <a:pPr marL="0" marR="0" lvl="0" indent="0" algn="l" defTabSz="914400" rtl="0" eaLnBrk="1" fontAlgn="auto" latinLnBrk="0" hangingPunct="1">
+              <a:lnSpc>
+                <a:spcPct val="100000"/>
+              </a:lnSpc>
+              <a:spcBef>
+                <a:spcPts val="0"/>
+              </a:spcBef>
+              <a:spcAft>
+                <a:spcPts val="0"/>
+              </a:spcAft>
+              <a:buClrTx/>
+              <a:buSzTx/>
+              <a:buFontTx/>
+              <a:buNone/>
+              <a:tabLst/>
+              <a:defRPr/>
+            </a:pPr>
+            <a:r>
+              <a:rPr lang="en-CA" dirty="0">
+                <a:latin typeface="Arial" panose="020B0604020202020204" pitchFamily="34" charset="0"/>
+                <a:cs typeface="Arial" panose="020B0604020202020204" pitchFamily="34" charset="0"/>
+              </a:rPr>
+              <a:t>Do deadlines or laziness exacerbate saving files on your Desktop (with the best intention of “organizing it later?”</a:t>
+            </a:r>
+          </a:p>
+        </p:txBody>
+      </p:sp>
+      <p:sp>
+        <p:nvSpPr>
+          <p:cNvPr id="4" name="Slide Number Placeholder 3"/>
+          <p:cNvSpPr>
+            <a:spLocks noGrp="1"/>
+          </p:cNvSpPr>
+          <p:nvPr>
+            <p:ph type="sldNum" sz="quarter" idx="5"/>
+          </p:nvPr>
+        </p:nvSpPr>
+        <p:spPr/>
+        <p:txBody>
+          <a:bodyPr/>
+          <a:lstStyle/>
+          <a:p>
+            <a:fld id="{BC8D36B5-FA4A-4112-AD12-101780DFA3F1}" type="slidenum">
+              <a:rPr lang="en-CA" smtClean="0"/>
+              <a:t>4</a:t>
+            </a:fld>
+            <a:endParaRPr lang="en-CA"/>
+          </a:p>
+        </p:txBody>
+      </p:sp>
+    </p:spTree>
+    <p:extLst>
+      <p:ext uri="{BB962C8B-B14F-4D97-AF65-F5344CB8AC3E}">
+        <p14:creationId xmlns:p14="http://schemas.microsoft.com/office/powerpoint/2010/main" val="78672539"/>
+      </p:ext>
+    </p:extLst>
+  </p:cSld>
+  <p:clrMapOvr>
+    <a:masterClrMapping/>
+  </p:clrMapOvr>
+</p:notes>
+</file>
+
 <file path=ppt/slideLayouts/slideLayout1.xml><?xml version="1.0" encoding="utf-8"?>
 <p:sldLayout xmlns:a="http://schemas.openxmlformats.org/drawingml/2006/main" xmlns:r="http://schemas.openxmlformats.org/officeDocument/2006/relationships" xmlns:p="http://schemas.openxmlformats.org/presentationml/2006/main" type="title" preserve="1">
   <p:cSld name="Title Slide">
@@ -270,7 +997,7 @@
           <a:p>
             <a:fld id="{CB04F220-6A09-4BAF-AEC6-CFD9394D7C59}" type="datetimeFigureOut">
               <a:rPr lang="en-CA" smtClean="0"/>
-              <a:t>2019-10-30</a:t>
+              <a:t>2019-11-01</a:t>
             </a:fld>
             <a:endParaRPr lang="en-CA"/>
           </a:p>
@@ -470,7 +1197,7 @@
           <a:p>
             <a:fld id="{CB04F220-6A09-4BAF-AEC6-CFD9394D7C59}" type="datetimeFigureOut">
               <a:rPr lang="en-CA" smtClean="0"/>
-              <a:t>2019-10-30</a:t>
+              <a:t>2019-11-01</a:t>
             </a:fld>
             <a:endParaRPr lang="en-CA"/>
           </a:p>
@@ -680,7 +1407,7 @@
           <a:p>
             <a:fld id="{CB04F220-6A09-4BAF-AEC6-CFD9394D7C59}" type="datetimeFigureOut">
               <a:rPr lang="en-CA" smtClean="0"/>
-              <a:t>2019-10-30</a:t>
+              <a:t>2019-11-01</a:t>
             </a:fld>
             <a:endParaRPr lang="en-CA"/>
           </a:p>
@@ -880,7 +1607,7 @@
           <a:p>
             <a:fld id="{CB04F220-6A09-4BAF-AEC6-CFD9394D7C59}" type="datetimeFigureOut">
               <a:rPr lang="en-CA" smtClean="0"/>
-              <a:t>2019-10-30</a:t>
+              <a:t>2019-11-01</a:t>
             </a:fld>
             <a:endParaRPr lang="en-CA"/>
           </a:p>
@@ -1156,7 +1883,7 @@
           <a:p>
             <a:fld id="{CB04F220-6A09-4BAF-AEC6-CFD9394D7C59}" type="datetimeFigureOut">
               <a:rPr lang="en-CA" smtClean="0"/>
-              <a:t>2019-10-30</a:t>
+              <a:t>2019-11-01</a:t>
             </a:fld>
             <a:endParaRPr lang="en-CA"/>
           </a:p>
@@ -1424,7 +2151,7 @@
           <a:p>
             <a:fld id="{CB04F220-6A09-4BAF-AEC6-CFD9394D7C59}" type="datetimeFigureOut">
               <a:rPr lang="en-CA" smtClean="0"/>
-              <a:t>2019-10-30</a:t>
+              <a:t>2019-11-01</a:t>
             </a:fld>
             <a:endParaRPr lang="en-CA"/>
           </a:p>
@@ -1839,7 +2566,7 @@
           <a:p>
             <a:fld id="{CB04F220-6A09-4BAF-AEC6-CFD9394D7C59}" type="datetimeFigureOut">
               <a:rPr lang="en-CA" smtClean="0"/>
-              <a:t>2019-10-30</a:t>
+              <a:t>2019-11-01</a:t>
             </a:fld>
             <a:endParaRPr lang="en-CA"/>
           </a:p>
@@ -1981,7 +2708,7 @@
           <a:p>
             <a:fld id="{CB04F220-6A09-4BAF-AEC6-CFD9394D7C59}" type="datetimeFigureOut">
               <a:rPr lang="en-CA" smtClean="0"/>
-              <a:t>2019-10-30</a:t>
+              <a:t>2019-11-01</a:t>
             </a:fld>
             <a:endParaRPr lang="en-CA"/>
           </a:p>
@@ -2094,7 +2821,7 @@
           <a:p>
             <a:fld id="{CB04F220-6A09-4BAF-AEC6-CFD9394D7C59}" type="datetimeFigureOut">
               <a:rPr lang="en-CA" smtClean="0"/>
-              <a:t>2019-10-30</a:t>
+              <a:t>2019-11-01</a:t>
             </a:fld>
             <a:endParaRPr lang="en-CA"/>
           </a:p>
@@ -2407,7 +3134,7 @@
           <a:p>
             <a:fld id="{CB04F220-6A09-4BAF-AEC6-CFD9394D7C59}" type="datetimeFigureOut">
               <a:rPr lang="en-CA" smtClean="0"/>
-              <a:t>2019-10-30</a:t>
+              <a:t>2019-11-01</a:t>
             </a:fld>
             <a:endParaRPr lang="en-CA"/>
           </a:p>
@@ -2696,7 +3423,7 @@
           <a:p>
             <a:fld id="{CB04F220-6A09-4BAF-AEC6-CFD9394D7C59}" type="datetimeFigureOut">
               <a:rPr lang="en-CA" smtClean="0"/>
-              <a:t>2019-10-30</a:t>
+              <a:t>2019-11-01</a:t>
             </a:fld>
             <a:endParaRPr lang="en-CA"/>
           </a:p>
@@ -2939,7 +3666,7 @@
           <a:p>
             <a:fld id="{CB04F220-6A09-4BAF-AEC6-CFD9394D7C59}" type="datetimeFigureOut">
               <a:rPr lang="en-CA" smtClean="0"/>
-              <a:t>2019-10-30</a:t>
+              <a:t>2019-11-01</a:t>
             </a:fld>
             <a:endParaRPr lang="en-CA"/>
           </a:p>
@@ -3379,7 +4106,7 @@
           <p:nvPr/>
         </p:nvPicPr>
         <p:blipFill>
-          <a:blip r:embed="rId2">
+          <a:blip r:embed="rId3">
             <a:extLst>
               <a:ext uri="{28A0092B-C50C-407E-A947-70E740481C1C}">
                 <a14:useLocalDpi xmlns:a14="http://schemas.microsoft.com/office/drawing/2010/main" val="0"/>
@@ -3551,139 +4278,6 @@
     <p:extLst>
       <p:ext uri="{BB962C8B-B14F-4D97-AF65-F5344CB8AC3E}">
         <p14:creationId xmlns:p14="http://schemas.microsoft.com/office/powerpoint/2010/main" val="735932333"/>
-      </p:ext>
-    </p:extLst>
-  </p:cSld>
-  <p:clrMapOvr>
-    <a:masterClrMapping/>
-  </p:clrMapOvr>
-</p:sld>
-</file>
-
-<file path=ppt/slides/slide10.xml><?xml version="1.0" encoding="utf-8"?>
-<p:sld xmlns:a="http://schemas.openxmlformats.org/drawingml/2006/main" xmlns:r="http://schemas.openxmlformats.org/officeDocument/2006/relationships" xmlns:p="http://schemas.openxmlformats.org/presentationml/2006/main">
-  <p:cSld>
-    <p:spTree>
-      <p:nvGrpSpPr>
-        <p:cNvPr id="1" name=""/>
-        <p:cNvGrpSpPr/>
-        <p:nvPr/>
-      </p:nvGrpSpPr>
-      <p:grpSpPr>
-        <a:xfrm>
-          <a:off x="0" y="0"/>
-          <a:ext cx="0" cy="0"/>
-          <a:chOff x="0" y="0"/>
-          <a:chExt cx="0" cy="0"/>
-        </a:xfrm>
-      </p:grpSpPr>
-      <p:sp>
-        <p:nvSpPr>
-          <p:cNvPr id="2" name="Title 1">
-            <a:extLst>
-              <a:ext uri="{FF2B5EF4-FFF2-40B4-BE49-F238E27FC236}">
-                <a16:creationId xmlns:a16="http://schemas.microsoft.com/office/drawing/2014/main" id="{2F4B5B6B-99E7-417D-BABC-62CD3DA1AA89}"/>
-              </a:ext>
-            </a:extLst>
-          </p:cNvPr>
-          <p:cNvSpPr>
-            <a:spLocks noGrp="1"/>
-          </p:cNvSpPr>
-          <p:nvPr>
-            <p:ph type="title"/>
-          </p:nvPr>
-        </p:nvSpPr>
-        <p:spPr/>
-        <p:txBody>
-          <a:bodyPr>
-            <a:normAutofit/>
-          </a:bodyPr>
-          <a:lstStyle/>
-          <a:p>
-            <a:r>
-              <a:rPr lang="en-CA" sz="3600" dirty="0">
-                <a:latin typeface="Arial" panose="020B0604020202020204" pitchFamily="34" charset="0"/>
-                <a:cs typeface="Arial" panose="020B0604020202020204" pitchFamily="34" charset="0"/>
-              </a:rPr>
-              <a:t>Track file versions</a:t>
-            </a:r>
-          </a:p>
-        </p:txBody>
-      </p:sp>
-      <p:sp>
-        <p:nvSpPr>
-          <p:cNvPr id="3" name="Content Placeholder 2">
-            <a:extLst>
-              <a:ext uri="{FF2B5EF4-FFF2-40B4-BE49-F238E27FC236}">
-                <a16:creationId xmlns:a16="http://schemas.microsoft.com/office/drawing/2014/main" id="{199AD3BA-A31A-452F-99C1-8A631BB832C9}"/>
-              </a:ext>
-            </a:extLst>
-          </p:cNvPr>
-          <p:cNvSpPr>
-            <a:spLocks noGrp="1"/>
-          </p:cNvSpPr>
-          <p:nvPr>
-            <p:ph idx="1"/>
-          </p:nvPr>
-        </p:nvSpPr>
-        <p:spPr/>
-        <p:txBody>
-          <a:bodyPr/>
-          <a:lstStyle/>
-          <a:p>
-            <a:r>
-              <a:rPr lang="en-CA" dirty="0">
-                <a:latin typeface="Arial" panose="020B0604020202020204" pitchFamily="34" charset="0"/>
-                <a:cs typeface="Arial" panose="020B0604020202020204" pitchFamily="34" charset="0"/>
-              </a:rPr>
-              <a:t>“_v1”, “_v2,”, “_v12”, “_final”, “_final2” – where does it end?!</a:t>
-            </a:r>
-          </a:p>
-          <a:p>
-            <a:r>
-              <a:rPr lang="en-CA" dirty="0">
-                <a:latin typeface="Arial" panose="020B0604020202020204" pitchFamily="34" charset="0"/>
-                <a:cs typeface="Arial" panose="020B0604020202020204" pitchFamily="34" charset="0"/>
-              </a:rPr>
-              <a:t>It ends with a file versioning system.</a:t>
-            </a:r>
-          </a:p>
-          <a:p>
-            <a:pPr lvl="1"/>
-            <a:r>
-              <a:rPr lang="en-CA" dirty="0">
-                <a:latin typeface="Arial" panose="020B0604020202020204" pitchFamily="34" charset="0"/>
-                <a:cs typeface="Arial" panose="020B0604020202020204" pitchFamily="34" charset="0"/>
-              </a:rPr>
-              <a:t>One file with a consistent file name</a:t>
-            </a:r>
-          </a:p>
-          <a:p>
-            <a:pPr lvl="1"/>
-            <a:r>
-              <a:rPr lang="en-CA" dirty="0">
-                <a:latin typeface="Arial" panose="020B0604020202020204" pitchFamily="34" charset="0"/>
-                <a:cs typeface="Arial" panose="020B0604020202020204" pitchFamily="34" charset="0"/>
-              </a:rPr>
-              <a:t>Modifications to the file are tracked by the versioning system</a:t>
-            </a:r>
-          </a:p>
-          <a:p>
-            <a:pPr lvl="1"/>
-            <a:r>
-              <a:rPr lang="en-CA" dirty="0">
-                <a:latin typeface="Arial" panose="020B0604020202020204" pitchFamily="34" charset="0"/>
-                <a:cs typeface="Arial" panose="020B0604020202020204" pitchFamily="34" charset="0"/>
-              </a:rPr>
-              <a:t>Earlier incarnations of the file are accessible if you decide you need to revert to an earlier version</a:t>
-            </a:r>
-          </a:p>
-        </p:txBody>
-      </p:sp>
-    </p:spTree>
-    <p:extLst>
-      <p:ext uri="{BB962C8B-B14F-4D97-AF65-F5344CB8AC3E}">
-        <p14:creationId xmlns:p14="http://schemas.microsoft.com/office/powerpoint/2010/main" val="1877003925"/>
       </p:ext>
     </p:extLst>
   </p:cSld>
@@ -3906,7 +4500,7 @@
           <p:nvPr/>
         </p:nvPicPr>
         <p:blipFill>
-          <a:blip r:embed="rId2">
+          <a:blip r:embed="rId3">
             <a:extLst>
               <a:ext uri="{28A0092B-C50C-407E-A947-70E740481C1C}">
                 <a14:useLocalDpi xmlns:a14="http://schemas.microsoft.com/office/drawing/2010/main" val="0"/>
@@ -4076,7 +4670,7 @@
           <p:nvPr/>
         </p:nvPicPr>
         <p:blipFill>
-          <a:blip r:embed="rId2">
+          <a:blip r:embed="rId3">
             <a:extLst>
               <a:ext uri="{28A0092B-C50C-407E-A947-70E740481C1C}">
                 <a14:useLocalDpi xmlns:a14="http://schemas.microsoft.com/office/drawing/2010/main" val="0"/>
@@ -4505,6 +5099,518 @@
 </file>
 
 <file path=ppt/slides/slide7.xml><?xml version="1.0" encoding="utf-8"?>
+<p:sld xmlns:a="http://schemas.openxmlformats.org/drawingml/2006/main" xmlns:r="http://schemas.openxmlformats.org/officeDocument/2006/relationships" xmlns:p="http://schemas.openxmlformats.org/presentationml/2006/main">
+  <p:cSld>
+    <p:spTree>
+      <p:nvGrpSpPr>
+        <p:cNvPr id="1" name=""/>
+        <p:cNvGrpSpPr/>
+        <p:nvPr/>
+      </p:nvGrpSpPr>
+      <p:grpSpPr>
+        <a:xfrm>
+          <a:off x="0" y="0"/>
+          <a:ext cx="0" cy="0"/>
+          <a:chOff x="0" y="0"/>
+          <a:chExt cx="0" cy="0"/>
+        </a:xfrm>
+      </p:grpSpPr>
+      <p:sp>
+        <p:nvSpPr>
+          <p:cNvPr id="2" name="Rectangle 1">
+            <a:extLst>
+              <a:ext uri="{FF2B5EF4-FFF2-40B4-BE49-F238E27FC236}">
+                <a16:creationId xmlns:a16="http://schemas.microsoft.com/office/drawing/2014/main" id="{FF39611C-0EBB-4BEC-81F6-9EEB0CE59BC1}"/>
+              </a:ext>
+            </a:extLst>
+          </p:cNvPr>
+          <p:cNvSpPr/>
+          <p:nvPr/>
+        </p:nvSpPr>
+        <p:spPr>
+          <a:xfrm>
+            <a:off x="0" y="308862"/>
+            <a:ext cx="12192000" cy="1446550"/>
+          </a:xfrm>
+          <a:prstGeom prst="rect">
+            <a:avLst/>
+          </a:prstGeom>
+        </p:spPr>
+        <p:txBody>
+          <a:bodyPr wrap="square">
+            <a:spAutoFit/>
+          </a:bodyPr>
+          <a:lstStyle/>
+          <a:p>
+            <a:pPr algn="ctr"/>
+            <a:r>
+              <a:rPr lang="en-CA" sz="4400" b="1" dirty="0"/>
+              <a:t>Solution #1</a:t>
+            </a:r>
+            <a:endParaRPr lang="en-CA" sz="4400" dirty="0"/>
+          </a:p>
+          <a:p>
+            <a:pPr algn="ctr"/>
+            <a:endParaRPr lang="en-CA" sz="4400" dirty="0"/>
+          </a:p>
+        </p:txBody>
+      </p:sp>
+      <p:pic>
+        <p:nvPicPr>
+          <p:cNvPr id="8" name="Picture 7">
+            <a:extLst>
+              <a:ext uri="{FF2B5EF4-FFF2-40B4-BE49-F238E27FC236}">
+                <a16:creationId xmlns:a16="http://schemas.microsoft.com/office/drawing/2014/main" id="{EDF80327-5C1D-4810-B060-3978DA8FB9B2}"/>
+              </a:ext>
+            </a:extLst>
+          </p:cNvPr>
+          <p:cNvPicPr>
+            <a:picLocks noChangeAspect="1"/>
+          </p:cNvPicPr>
+          <p:nvPr/>
+        </p:nvPicPr>
+        <p:blipFill>
+          <a:blip r:embed="rId2">
+            <a:extLst>
+              <a:ext uri="{28A0092B-C50C-407E-A947-70E740481C1C}">
+                <a14:useLocalDpi xmlns:a14="http://schemas.microsoft.com/office/drawing/2010/main" val="0"/>
+              </a:ext>
+            </a:extLst>
+          </a:blip>
+          <a:stretch>
+            <a:fillRect/>
+          </a:stretch>
+        </p:blipFill>
+        <p:spPr>
+          <a:xfrm>
+            <a:off x="665477" y="1315582"/>
+            <a:ext cx="2970690" cy="1996115"/>
+          </a:xfrm>
+          <a:prstGeom prst="rect">
+            <a:avLst/>
+          </a:prstGeom>
+          <a:ln>
+            <a:solidFill>
+              <a:schemeClr val="bg1">
+                <a:lumMod val="75000"/>
+              </a:schemeClr>
+            </a:solidFill>
+          </a:ln>
+        </p:spPr>
+      </p:pic>
+      <p:pic>
+        <p:nvPicPr>
+          <p:cNvPr id="10" name="Picture 9">
+            <a:extLst>
+              <a:ext uri="{FF2B5EF4-FFF2-40B4-BE49-F238E27FC236}">
+                <a16:creationId xmlns:a16="http://schemas.microsoft.com/office/drawing/2014/main" id="{A7E4D8E7-8B3C-4509-8ED3-B0654C1A6100}"/>
+              </a:ext>
+            </a:extLst>
+          </p:cNvPr>
+          <p:cNvPicPr>
+            <a:picLocks noChangeAspect="1"/>
+          </p:cNvPicPr>
+          <p:nvPr/>
+        </p:nvPicPr>
+        <p:blipFill>
+          <a:blip r:embed="rId3">
+            <a:extLst>
+              <a:ext uri="{28A0092B-C50C-407E-A947-70E740481C1C}">
+                <a14:useLocalDpi xmlns:a14="http://schemas.microsoft.com/office/drawing/2010/main" val="0"/>
+              </a:ext>
+            </a:extLst>
+          </a:blip>
+          <a:stretch>
+            <a:fillRect/>
+          </a:stretch>
+        </p:blipFill>
+        <p:spPr>
+          <a:xfrm>
+            <a:off x="7311071" y="3311697"/>
+            <a:ext cx="4237462" cy="2259231"/>
+          </a:xfrm>
+          <a:prstGeom prst="rect">
+            <a:avLst/>
+          </a:prstGeom>
+          <a:ln>
+            <a:solidFill>
+              <a:schemeClr val="bg1">
+                <a:lumMod val="75000"/>
+              </a:schemeClr>
+            </a:solidFill>
+          </a:ln>
+        </p:spPr>
+      </p:pic>
+      <p:pic>
+        <p:nvPicPr>
+          <p:cNvPr id="12" name="Picture 11">
+            <a:extLst>
+              <a:ext uri="{FF2B5EF4-FFF2-40B4-BE49-F238E27FC236}">
+                <a16:creationId xmlns:a16="http://schemas.microsoft.com/office/drawing/2014/main" id="{B9F32967-7619-471A-8E6C-4F2943AE6FE0}"/>
+              </a:ext>
+            </a:extLst>
+          </p:cNvPr>
+          <p:cNvPicPr>
+            <a:picLocks noChangeAspect="1"/>
+          </p:cNvPicPr>
+          <p:nvPr/>
+        </p:nvPicPr>
+        <p:blipFill>
+          <a:blip r:embed="rId4">
+            <a:extLst>
+              <a:ext uri="{28A0092B-C50C-407E-A947-70E740481C1C}">
+                <a14:useLocalDpi xmlns:a14="http://schemas.microsoft.com/office/drawing/2010/main" val="0"/>
+              </a:ext>
+            </a:extLst>
+          </a:blip>
+          <a:stretch>
+            <a:fillRect/>
+          </a:stretch>
+        </p:blipFill>
+        <p:spPr>
+          <a:xfrm>
+            <a:off x="3767505" y="2297715"/>
+            <a:ext cx="3412228" cy="2804874"/>
+          </a:xfrm>
+          <a:prstGeom prst="rect">
+            <a:avLst/>
+          </a:prstGeom>
+          <a:ln>
+            <a:solidFill>
+              <a:schemeClr val="bg1">
+                <a:lumMod val="75000"/>
+              </a:schemeClr>
+            </a:solidFill>
+          </a:ln>
+        </p:spPr>
+      </p:pic>
+    </p:spTree>
+    <p:extLst>
+      <p:ext uri="{BB962C8B-B14F-4D97-AF65-F5344CB8AC3E}">
+        <p14:creationId xmlns:p14="http://schemas.microsoft.com/office/powerpoint/2010/main" val="2352338810"/>
+      </p:ext>
+    </p:extLst>
+  </p:cSld>
+  <p:clrMapOvr>
+    <a:masterClrMapping/>
+  </p:clrMapOvr>
+  <p:timing>
+    <p:tnLst>
+      <p:par>
+        <p:cTn id="1" dur="indefinite" restart="never" nodeType="tmRoot">
+          <p:childTnLst>
+            <p:seq concurrent="1" nextAc="seek">
+              <p:cTn id="2" dur="indefinite" nodeType="mainSeq">
+                <p:childTnLst>
+                  <p:par>
+                    <p:cTn id="3" fill="hold">
+                      <p:stCondLst>
+                        <p:cond delay="indefinite"/>
+                      </p:stCondLst>
+                      <p:childTnLst>
+                        <p:par>
+                          <p:cTn id="4" fill="hold">
+                            <p:stCondLst>
+                              <p:cond delay="0"/>
+                            </p:stCondLst>
+                            <p:childTnLst>
+                              <p:par>
+                                <p:cTn id="5" presetID="1" presetClass="entr" presetSubtype="0" fill="hold" nodeType="clickEffect">
+                                  <p:stCondLst>
+                                    <p:cond delay="0"/>
+                                  </p:stCondLst>
+                                  <p:childTnLst>
+                                    <p:set>
+                                      <p:cBhvr>
+                                        <p:cTn id="6" dur="1" fill="hold">
+                                          <p:stCondLst>
+                                            <p:cond delay="0"/>
+                                          </p:stCondLst>
+                                        </p:cTn>
+                                        <p:tgtEl>
+                                          <p:spTgt spid="8"/>
+                                        </p:tgtEl>
+                                        <p:attrNameLst>
+                                          <p:attrName>style.visibility</p:attrName>
+                                        </p:attrNameLst>
+                                      </p:cBhvr>
+                                      <p:to>
+                                        <p:strVal val="visible"/>
+                                      </p:to>
+                                    </p:set>
+                                  </p:childTnLst>
+                                </p:cTn>
+                              </p:par>
+                            </p:childTnLst>
+                          </p:cTn>
+                        </p:par>
+                      </p:childTnLst>
+                    </p:cTn>
+                  </p:par>
+                  <p:par>
+                    <p:cTn id="7" fill="hold">
+                      <p:stCondLst>
+                        <p:cond delay="indefinite"/>
+                      </p:stCondLst>
+                      <p:childTnLst>
+                        <p:par>
+                          <p:cTn id="8" fill="hold">
+                            <p:stCondLst>
+                              <p:cond delay="0"/>
+                            </p:stCondLst>
+                            <p:childTnLst>
+                              <p:par>
+                                <p:cTn id="9" presetID="1" presetClass="entr" presetSubtype="0" fill="hold" nodeType="clickEffect">
+                                  <p:stCondLst>
+                                    <p:cond delay="0"/>
+                                  </p:stCondLst>
+                                  <p:childTnLst>
+                                    <p:set>
+                                      <p:cBhvr>
+                                        <p:cTn id="10" dur="1" fill="hold">
+                                          <p:stCondLst>
+                                            <p:cond delay="0"/>
+                                          </p:stCondLst>
+                                        </p:cTn>
+                                        <p:tgtEl>
+                                          <p:spTgt spid="12"/>
+                                        </p:tgtEl>
+                                        <p:attrNameLst>
+                                          <p:attrName>style.visibility</p:attrName>
+                                        </p:attrNameLst>
+                                      </p:cBhvr>
+                                      <p:to>
+                                        <p:strVal val="visible"/>
+                                      </p:to>
+                                    </p:set>
+                                  </p:childTnLst>
+                                </p:cTn>
+                              </p:par>
+                            </p:childTnLst>
+                          </p:cTn>
+                        </p:par>
+                      </p:childTnLst>
+                    </p:cTn>
+                  </p:par>
+                  <p:par>
+                    <p:cTn id="11" fill="hold">
+                      <p:stCondLst>
+                        <p:cond delay="indefinite"/>
+                      </p:stCondLst>
+                      <p:childTnLst>
+                        <p:par>
+                          <p:cTn id="12" fill="hold">
+                            <p:stCondLst>
+                              <p:cond delay="0"/>
+                            </p:stCondLst>
+                            <p:childTnLst>
+                              <p:par>
+                                <p:cTn id="13" presetID="1" presetClass="entr" presetSubtype="0" fill="hold" nodeType="clickEffect">
+                                  <p:stCondLst>
+                                    <p:cond delay="0"/>
+                                  </p:stCondLst>
+                                  <p:childTnLst>
+                                    <p:set>
+                                      <p:cBhvr>
+                                        <p:cTn id="14" dur="1" fill="hold">
+                                          <p:stCondLst>
+                                            <p:cond delay="0"/>
+                                          </p:stCondLst>
+                                        </p:cTn>
+                                        <p:tgtEl>
+                                          <p:spTgt spid="10"/>
+                                        </p:tgtEl>
+                                        <p:attrNameLst>
+                                          <p:attrName>style.visibility</p:attrName>
+                                        </p:attrNameLst>
+                                      </p:cBhvr>
+                                      <p:to>
+                                        <p:strVal val="visible"/>
+                                      </p:to>
+                                    </p:set>
+                                  </p:childTnLst>
+                                </p:cTn>
+                              </p:par>
+                            </p:childTnLst>
+                          </p:cTn>
+                        </p:par>
+                      </p:childTnLst>
+                    </p:cTn>
+                  </p:par>
+                </p:childTnLst>
+              </p:cTn>
+              <p:prevCondLst>
+                <p:cond evt="onPrev" delay="0">
+                  <p:tgtEl>
+                    <p:sldTgt/>
+                  </p:tgtEl>
+                </p:cond>
+              </p:prevCondLst>
+              <p:nextCondLst>
+                <p:cond evt="onNext" delay="0">
+                  <p:tgtEl>
+                    <p:sldTgt/>
+                  </p:tgtEl>
+                </p:cond>
+              </p:nextCondLst>
+            </p:seq>
+          </p:childTnLst>
+        </p:cTn>
+      </p:par>
+    </p:tnLst>
+  </p:timing>
+</p:sld>
+</file>
+
+<file path=ppt/slides/slide8.xml><?xml version="1.0" encoding="utf-8"?>
+<p:sld xmlns:a="http://schemas.openxmlformats.org/drawingml/2006/main" xmlns:r="http://schemas.openxmlformats.org/officeDocument/2006/relationships" xmlns:p="http://schemas.openxmlformats.org/presentationml/2006/main">
+  <p:cSld>
+    <p:spTree>
+      <p:nvGrpSpPr>
+        <p:cNvPr id="1" name=""/>
+        <p:cNvGrpSpPr/>
+        <p:nvPr/>
+      </p:nvGrpSpPr>
+      <p:grpSpPr>
+        <a:xfrm>
+          <a:off x="0" y="0"/>
+          <a:ext cx="0" cy="0"/>
+          <a:chOff x="0" y="0"/>
+          <a:chExt cx="0" cy="0"/>
+        </a:xfrm>
+      </p:grpSpPr>
+      <p:pic>
+        <p:nvPicPr>
+          <p:cNvPr id="1026" name="Picture 2" descr="Image result for book">
+            <a:extLst>
+              <a:ext uri="{FF2B5EF4-FFF2-40B4-BE49-F238E27FC236}">
+                <a16:creationId xmlns:a16="http://schemas.microsoft.com/office/drawing/2014/main" id="{F27BAC20-016F-4CF4-ABD5-4A1216E0BD4A}"/>
+              </a:ext>
+            </a:extLst>
+          </p:cNvPr>
+          <p:cNvPicPr>
+            <a:picLocks noChangeAspect="1" noChangeArrowheads="1"/>
+          </p:cNvPicPr>
+          <p:nvPr/>
+        </p:nvPicPr>
+        <p:blipFill>
+          <a:blip r:embed="rId2">
+            <a:extLst>
+              <a:ext uri="{28A0092B-C50C-407E-A947-70E740481C1C}">
+                <a14:useLocalDpi xmlns:a14="http://schemas.microsoft.com/office/drawing/2010/main" val="0"/>
+              </a:ext>
+            </a:extLst>
+          </a:blip>
+          <a:srcRect/>
+          <a:stretch>
+            <a:fillRect/>
+          </a:stretch>
+        </p:blipFill>
+        <p:spPr bwMode="auto">
+          <a:xfrm>
+            <a:off x="1163638" y="0"/>
+            <a:ext cx="9863137" cy="6858000"/>
+          </a:xfrm>
+          <a:prstGeom prst="rect">
+            <a:avLst/>
+          </a:prstGeom>
+          <a:noFill/>
+          <a:extLst>
+            <a:ext uri="{909E8E84-426E-40DD-AFC4-6F175D3DCCD1}">
+              <a14:hiddenFill xmlns:a14="http://schemas.microsoft.com/office/drawing/2010/main">
+                <a:solidFill>
+                  <a:srgbClr val="FFFFFF"/>
+                </a:solidFill>
+              </a14:hiddenFill>
+            </a:ext>
+          </a:extLst>
+        </p:spPr>
+      </p:pic>
+      <p:sp>
+        <p:nvSpPr>
+          <p:cNvPr id="2" name="Rectangle 1">
+            <a:extLst>
+              <a:ext uri="{FF2B5EF4-FFF2-40B4-BE49-F238E27FC236}">
+                <a16:creationId xmlns:a16="http://schemas.microsoft.com/office/drawing/2014/main" id="{FF39611C-0EBB-4BEC-81F6-9EEB0CE59BC1}"/>
+              </a:ext>
+            </a:extLst>
+          </p:cNvPr>
+          <p:cNvSpPr/>
+          <p:nvPr/>
+        </p:nvSpPr>
+        <p:spPr>
+          <a:xfrm>
+            <a:off x="2556389" y="2772692"/>
+            <a:ext cx="2812026" cy="769441"/>
+          </a:xfrm>
+          <a:prstGeom prst="rect">
+            <a:avLst/>
+          </a:prstGeom>
+        </p:spPr>
+        <p:txBody>
+          <a:bodyPr wrap="square">
+            <a:spAutoFit/>
+          </a:bodyPr>
+          <a:lstStyle/>
+          <a:p>
+            <a:pPr algn="ctr"/>
+            <a:r>
+              <a:rPr lang="en-CA" sz="4400" b="1" dirty="0"/>
+              <a:t>Solution #2</a:t>
+            </a:r>
+            <a:endParaRPr lang="en-CA" sz="4400" dirty="0"/>
+          </a:p>
+        </p:txBody>
+      </p:sp>
+      <p:sp>
+        <p:nvSpPr>
+          <p:cNvPr id="4" name="Rectangle 3">
+            <a:extLst>
+              <a:ext uri="{FF2B5EF4-FFF2-40B4-BE49-F238E27FC236}">
+                <a16:creationId xmlns:a16="http://schemas.microsoft.com/office/drawing/2014/main" id="{4DD2C814-5714-4B83-903F-27F7D2C4BDB0}"/>
+              </a:ext>
+            </a:extLst>
+          </p:cNvPr>
+          <p:cNvSpPr/>
+          <p:nvPr/>
+        </p:nvSpPr>
+        <p:spPr>
+          <a:xfrm>
+            <a:off x="6178524" y="2603415"/>
+            <a:ext cx="4829998" cy="1107996"/>
+          </a:xfrm>
+          <a:prstGeom prst="rect">
+            <a:avLst/>
+          </a:prstGeom>
+        </p:spPr>
+        <p:txBody>
+          <a:bodyPr wrap="square">
+            <a:spAutoFit/>
+          </a:bodyPr>
+          <a:lstStyle/>
+          <a:p>
+            <a:r>
+              <a:rPr lang="en-CA" sz="6600" b="1" dirty="0"/>
+              <a:t>READMEs</a:t>
+            </a:r>
+            <a:endParaRPr lang="en-CA" sz="6600" dirty="0"/>
+          </a:p>
+        </p:txBody>
+      </p:sp>
+    </p:spTree>
+    <p:extLst>
+      <p:ext uri="{BB962C8B-B14F-4D97-AF65-F5344CB8AC3E}">
+        <p14:creationId xmlns:p14="http://schemas.microsoft.com/office/powerpoint/2010/main" val="981152275"/>
+      </p:ext>
+    </p:extLst>
+  </p:cSld>
+  <p:clrMapOvr>
+    <a:masterClrMapping/>
+  </p:clrMapOvr>
+</p:sld>
+</file>
+
+<file path=ppt/slides/slide9.xml><?xml version="1.0" encoding="utf-8"?>
 <p:sld xmlns:a="http://schemas.openxmlformats.org/drawingml/2006/main" xmlns:r="http://schemas.openxmlformats.org/officeDocument/2006/relationships" xmlns:p="http://schemas.openxmlformats.org/presentationml/2006/main">
   <p:cSld>
     <p:spTree>
@@ -4778,34 +5884,7 @@
                 <a:latin typeface="Arial" panose="020B0604020202020204" pitchFamily="34" charset="0"/>
                 <a:cs typeface="Arial" panose="020B0604020202020204" pitchFamily="34" charset="0"/>
               </a:rPr>
-              <a:t>Project folder structure (projects directory with individual project subdirectories)</a:t>
-            </a:r>
-          </a:p>
-          <a:p>
-            <a:r>
-              <a:rPr lang="en-CA" dirty="0">
-                <a:latin typeface="Arial" panose="020B0604020202020204" pitchFamily="34" charset="0"/>
-                <a:cs typeface="Arial" panose="020B0604020202020204" pitchFamily="34" charset="0"/>
-              </a:rPr>
-              <a:t>File naming</a:t>
-            </a:r>
-          </a:p>
-          <a:p>
-            <a:r>
-              <a:rPr lang="en-CA" dirty="0">
-                <a:latin typeface="Arial" panose="020B0604020202020204" pitchFamily="34" charset="0"/>
-                <a:cs typeface="Arial" panose="020B0604020202020204" pitchFamily="34" charset="0"/>
-              </a:rPr>
               <a:t>Set up version control</a:t>
-            </a:r>
-          </a:p>
-          <a:p>
-            <a:r>
-              <a:rPr lang="en-CA" dirty="0">
-                <a:latin typeface="Arial" panose="020B0604020202020204" pitchFamily="34" charset="0"/>
-                <a:cs typeface="Arial" panose="020B0604020202020204" pitchFamily="34" charset="0"/>
-              </a:rPr>
-              <a:t>READMEs</a:t>
             </a:r>
           </a:p>
           <a:p>
@@ -4841,281 +5920,6 @@
     <p:extLst>
       <p:ext uri="{BB962C8B-B14F-4D97-AF65-F5344CB8AC3E}">
         <p14:creationId xmlns:p14="http://schemas.microsoft.com/office/powerpoint/2010/main" val="424032669"/>
-      </p:ext>
-    </p:extLst>
-  </p:cSld>
-  <p:clrMapOvr>
-    <a:masterClrMapping/>
-  </p:clrMapOvr>
-</p:sld>
-</file>
-
-<file path=ppt/slides/slide8.xml><?xml version="1.0" encoding="utf-8"?>
-<p:sld xmlns:a="http://schemas.openxmlformats.org/drawingml/2006/main" xmlns:r="http://schemas.openxmlformats.org/officeDocument/2006/relationships" xmlns:p="http://schemas.openxmlformats.org/presentationml/2006/main">
-  <p:cSld>
-    <p:spTree>
-      <p:nvGrpSpPr>
-        <p:cNvPr id="1" name=""/>
-        <p:cNvGrpSpPr/>
-        <p:nvPr/>
-      </p:nvGrpSpPr>
-      <p:grpSpPr>
-        <a:xfrm>
-          <a:off x="0" y="0"/>
-          <a:ext cx="0" cy="0"/>
-          <a:chOff x="0" y="0"/>
-          <a:chExt cx="0" cy="0"/>
-        </a:xfrm>
-      </p:grpSpPr>
-      <p:sp>
-        <p:nvSpPr>
-          <p:cNvPr id="2" name="Title 1">
-            <a:extLst>
-              <a:ext uri="{FF2B5EF4-FFF2-40B4-BE49-F238E27FC236}">
-                <a16:creationId xmlns:a16="http://schemas.microsoft.com/office/drawing/2014/main" id="{2F4B5B6B-99E7-417D-BABC-62CD3DA1AA89}"/>
-              </a:ext>
-            </a:extLst>
-          </p:cNvPr>
-          <p:cNvSpPr>
-            <a:spLocks noGrp="1"/>
-          </p:cNvSpPr>
-          <p:nvPr>
-            <p:ph type="title"/>
-          </p:nvPr>
-        </p:nvSpPr>
-        <p:spPr/>
-        <p:txBody>
-          <a:bodyPr>
-            <a:normAutofit/>
-          </a:bodyPr>
-          <a:lstStyle/>
-          <a:p>
-            <a:r>
-              <a:rPr lang="en-CA" sz="3600" dirty="0">
-                <a:solidFill>
-                  <a:srgbClr val="FF0000"/>
-                </a:solidFill>
-                <a:latin typeface="Arial" panose="020B0604020202020204" pitchFamily="34" charset="0"/>
-                <a:cs typeface="Arial" panose="020B0604020202020204" pitchFamily="34" charset="0"/>
-              </a:rPr>
-              <a:t>File chaos</a:t>
-            </a:r>
-          </a:p>
-        </p:txBody>
-      </p:sp>
-      <p:sp>
-        <p:nvSpPr>
-          <p:cNvPr id="3" name="Content Placeholder 2">
-            <a:extLst>
-              <a:ext uri="{FF2B5EF4-FFF2-40B4-BE49-F238E27FC236}">
-                <a16:creationId xmlns:a16="http://schemas.microsoft.com/office/drawing/2014/main" id="{199AD3BA-A31A-452F-99C1-8A631BB832C9}"/>
-              </a:ext>
-            </a:extLst>
-          </p:cNvPr>
-          <p:cNvSpPr>
-            <a:spLocks noGrp="1"/>
-          </p:cNvSpPr>
-          <p:nvPr>
-            <p:ph idx="1"/>
-          </p:nvPr>
-        </p:nvSpPr>
-        <p:spPr/>
-        <p:txBody>
-          <a:bodyPr>
-            <a:normAutofit/>
-          </a:bodyPr>
-          <a:lstStyle/>
-          <a:p>
-            <a:r>
-              <a:rPr lang="en-CA" dirty="0">
-                <a:latin typeface="Arial" panose="020B0604020202020204" pitchFamily="34" charset="0"/>
-                <a:cs typeface="Arial" panose="020B0604020202020204" pitchFamily="34" charset="0"/>
-              </a:rPr>
-              <a:t>How much time do you spend looking for files saved on your computer?</a:t>
-            </a:r>
-          </a:p>
-          <a:p>
-            <a:r>
-              <a:rPr lang="en-CA" dirty="0">
-                <a:latin typeface="Arial" panose="020B0604020202020204" pitchFamily="34" charset="0"/>
-                <a:cs typeface="Arial" panose="020B0604020202020204" pitchFamily="34" charset="0"/>
-              </a:rPr>
-              <a:t>Once you’ve managed to find the file, are you faced with multiple files named for incremental versions?</a:t>
-            </a:r>
-          </a:p>
-          <a:p>
-            <a:r>
-              <a:rPr lang="en-CA" dirty="0">
-                <a:latin typeface="Arial" panose="020B0604020202020204" pitchFamily="34" charset="0"/>
-                <a:cs typeface="Arial" panose="020B0604020202020204" pitchFamily="34" charset="0"/>
-              </a:rPr>
-              <a:t>Do you choose between “</a:t>
-            </a:r>
-            <a:r>
-              <a:rPr lang="en-CA" dirty="0" err="1">
-                <a:latin typeface="Arial" panose="020B0604020202020204" pitchFamily="34" charset="0"/>
-                <a:cs typeface="Arial" panose="020B0604020202020204" pitchFamily="34" charset="0"/>
-              </a:rPr>
-              <a:t>FILE_final</a:t>
-            </a:r>
-            <a:r>
-              <a:rPr lang="en-CA" dirty="0">
-                <a:latin typeface="Arial" panose="020B0604020202020204" pitchFamily="34" charset="0"/>
-                <a:cs typeface="Arial" panose="020B0604020202020204" pitchFamily="34" charset="0"/>
-              </a:rPr>
-              <a:t>” and “</a:t>
-            </a:r>
-            <a:r>
-              <a:rPr lang="en-CA" dirty="0" err="1">
-                <a:latin typeface="Arial" panose="020B0604020202020204" pitchFamily="34" charset="0"/>
-                <a:cs typeface="Arial" panose="020B0604020202020204" pitchFamily="34" charset="0"/>
-              </a:rPr>
-              <a:t>FILE_best_version</a:t>
-            </a:r>
-            <a:r>
-              <a:rPr lang="en-CA" dirty="0">
-                <a:latin typeface="Arial" panose="020B0604020202020204" pitchFamily="34" charset="0"/>
-                <a:cs typeface="Arial" panose="020B0604020202020204" pitchFamily="34" charset="0"/>
-              </a:rPr>
-              <a:t>” by opening up a dozen files?</a:t>
-            </a:r>
-          </a:p>
-          <a:p>
-            <a:r>
-              <a:rPr lang="en-CA" dirty="0">
-                <a:latin typeface="Arial" panose="020B0604020202020204" pitchFamily="34" charset="0"/>
-                <a:cs typeface="Arial" panose="020B0604020202020204" pitchFamily="34" charset="0"/>
-              </a:rPr>
-              <a:t>Do deadlines or laziness exacerbate saving files on your Desktop (with the best intention of “organizing it later?”</a:t>
-            </a:r>
-          </a:p>
-        </p:txBody>
-      </p:sp>
-    </p:spTree>
-    <p:extLst>
-      <p:ext uri="{BB962C8B-B14F-4D97-AF65-F5344CB8AC3E}">
-        <p14:creationId xmlns:p14="http://schemas.microsoft.com/office/powerpoint/2010/main" val="3157605048"/>
-      </p:ext>
-    </p:extLst>
-  </p:cSld>
-  <p:clrMapOvr>
-    <a:masterClrMapping/>
-  </p:clrMapOvr>
-</p:sld>
-</file>
-
-<file path=ppt/slides/slide9.xml><?xml version="1.0" encoding="utf-8"?>
-<p:sld xmlns:a="http://schemas.openxmlformats.org/drawingml/2006/main" xmlns:r="http://schemas.openxmlformats.org/officeDocument/2006/relationships" xmlns:p="http://schemas.openxmlformats.org/presentationml/2006/main">
-  <p:cSld>
-    <p:spTree>
-      <p:nvGrpSpPr>
-        <p:cNvPr id="1" name=""/>
-        <p:cNvGrpSpPr/>
-        <p:nvPr/>
-      </p:nvGrpSpPr>
-      <p:grpSpPr>
-        <a:xfrm>
-          <a:off x="0" y="0"/>
-          <a:ext cx="0" cy="0"/>
-          <a:chOff x="0" y="0"/>
-          <a:chExt cx="0" cy="0"/>
-        </a:xfrm>
-      </p:grpSpPr>
-      <p:sp>
-        <p:nvSpPr>
-          <p:cNvPr id="2" name="Title 1">
-            <a:extLst>
-              <a:ext uri="{FF2B5EF4-FFF2-40B4-BE49-F238E27FC236}">
-                <a16:creationId xmlns:a16="http://schemas.microsoft.com/office/drawing/2014/main" id="{2F4B5B6B-99E7-417D-BABC-62CD3DA1AA89}"/>
-              </a:ext>
-            </a:extLst>
-          </p:cNvPr>
-          <p:cNvSpPr>
-            <a:spLocks noGrp="1"/>
-          </p:cNvSpPr>
-          <p:nvPr>
-            <p:ph type="title"/>
-          </p:nvPr>
-        </p:nvSpPr>
-        <p:spPr/>
-        <p:txBody>
-          <a:bodyPr>
-            <a:normAutofit/>
-          </a:bodyPr>
-          <a:lstStyle/>
-          <a:p>
-            <a:r>
-              <a:rPr lang="en-CA" sz="3600" dirty="0">
-                <a:latin typeface="Arial" panose="020B0604020202020204" pitchFamily="34" charset="0"/>
-                <a:cs typeface="Arial" panose="020B0604020202020204" pitchFamily="34" charset="0"/>
-              </a:rPr>
-              <a:t>Solution: Create an organized folder structure</a:t>
-            </a:r>
-          </a:p>
-        </p:txBody>
-      </p:sp>
-      <p:sp>
-        <p:nvSpPr>
-          <p:cNvPr id="3" name="Content Placeholder 2">
-            <a:extLst>
-              <a:ext uri="{FF2B5EF4-FFF2-40B4-BE49-F238E27FC236}">
-                <a16:creationId xmlns:a16="http://schemas.microsoft.com/office/drawing/2014/main" id="{199AD3BA-A31A-452F-99C1-8A631BB832C9}"/>
-              </a:ext>
-            </a:extLst>
-          </p:cNvPr>
-          <p:cNvSpPr>
-            <a:spLocks noGrp="1"/>
-          </p:cNvSpPr>
-          <p:nvPr>
-            <p:ph idx="1"/>
-          </p:nvPr>
-        </p:nvSpPr>
-        <p:spPr/>
-        <p:txBody>
-          <a:bodyPr/>
-          <a:lstStyle/>
-          <a:p>
-            <a:r>
-              <a:rPr lang="en-CA" dirty="0">
-                <a:latin typeface="Arial" panose="020B0604020202020204" pitchFamily="34" charset="0"/>
-                <a:cs typeface="Arial" panose="020B0604020202020204" pitchFamily="34" charset="0"/>
-              </a:rPr>
-              <a:t>Have a projects directory</a:t>
-            </a:r>
-          </a:p>
-          <a:p>
-            <a:r>
-              <a:rPr lang="en-CA" dirty="0">
-                <a:latin typeface="Arial" panose="020B0604020202020204" pitchFamily="34" charset="0"/>
-                <a:cs typeface="Arial" panose="020B0604020202020204" pitchFamily="34" charset="0"/>
-              </a:rPr>
-              <a:t>Every project has its own directory (folder)</a:t>
-            </a:r>
-          </a:p>
-          <a:p>
-            <a:r>
-              <a:rPr lang="en-CA" dirty="0">
-                <a:latin typeface="Arial" panose="020B0604020202020204" pitchFamily="34" charset="0"/>
-                <a:cs typeface="Arial" panose="020B0604020202020204" pitchFamily="34" charset="0"/>
-              </a:rPr>
-              <a:t>Subdirectories (subfolders) are named with keywords (e.g. data, output, scripts, figures)</a:t>
-            </a:r>
-          </a:p>
-          <a:p>
-            <a:r>
-              <a:rPr lang="en-CA" dirty="0">
-                <a:latin typeface="Arial" panose="020B0604020202020204" pitchFamily="34" charset="0"/>
-                <a:cs typeface="Arial" panose="020B0604020202020204" pitchFamily="34" charset="0"/>
-              </a:rPr>
-              <a:t>Be consistent across project folder structures because to make things easy on yourself</a:t>
-            </a:r>
-          </a:p>
-        </p:txBody>
-      </p:sp>
-    </p:spTree>
-    <p:extLst>
-      <p:ext uri="{BB962C8B-B14F-4D97-AF65-F5344CB8AC3E}">
-        <p14:creationId xmlns:p14="http://schemas.microsoft.com/office/powerpoint/2010/main" val="2602763021"/>
       </p:ext>
     </p:extLst>
   </p:cSld>
@@ -5418,4 +6222,299 @@
     </a:ext>
   </a:extLst>
 </a:theme>
+</file>
+
+<file path=ppt/theme/theme2.xml><?xml version="1.0" encoding="utf-8"?>
+<a:theme xmlns:a="http://schemas.openxmlformats.org/drawingml/2006/main" name="Office Theme">
+  <a:themeElements>
+    <a:clrScheme name="Office">
+      <a:dk1>
+        <a:sysClr val="windowText" lastClr="000000"/>
+      </a:dk1>
+      <a:lt1>
+        <a:sysClr val="window" lastClr="FFFFFF"/>
+      </a:lt1>
+      <a:dk2>
+        <a:srgbClr val="44546A"/>
+      </a:dk2>
+      <a:lt2>
+        <a:srgbClr val="E7E6E6"/>
+      </a:lt2>
+      <a:accent1>
+        <a:srgbClr val="4472C4"/>
+      </a:accent1>
+      <a:accent2>
+        <a:srgbClr val="ED7D31"/>
+      </a:accent2>
+      <a:accent3>
+        <a:srgbClr val="A5A5A5"/>
+      </a:accent3>
+      <a:accent4>
+        <a:srgbClr val="FFC000"/>
+      </a:accent4>
+      <a:accent5>
+        <a:srgbClr val="5B9BD5"/>
+      </a:accent5>
+      <a:accent6>
+        <a:srgbClr val="70AD47"/>
+      </a:accent6>
+      <a:hlink>
+        <a:srgbClr val="0563C1"/>
+      </a:hlink>
+      <a:folHlink>
+        <a:srgbClr val="954F72"/>
+      </a:folHlink>
+    </a:clrScheme>
+    <a:fontScheme name="Office">
+      <a:majorFont>
+        <a:latin typeface="Calibri Light" panose="020F0302020204030204"/>
+        <a:ea typeface=""/>
+        <a:cs typeface=""/>
+        <a:font script="Jpan" typeface="游ゴシック Light"/>
+        <a:font script="Hang" typeface="맑은 고딕"/>
+        <a:font script="Hans" typeface="等线 Light"/>
+        <a:font script="Hant" typeface="新細明體"/>
+        <a:font script="Arab" typeface="Times New Roman"/>
+        <a:font script="Hebr" typeface="Times New Roman"/>
+        <a:font script="Thai" typeface="Angsana New"/>
+        <a:font script="Ethi" typeface="Nyala"/>
+        <a:font script="Beng" typeface="Vrinda"/>
+        <a:font script="Gujr" typeface="Shruti"/>
+        <a:font script="Khmr" typeface="MoolBoran"/>
+        <a:font script="Knda" typeface="Tunga"/>
+        <a:font script="Guru" typeface="Raavi"/>
+        <a:font script="Cans" typeface="Euphemia"/>
+        <a:font script="Cher" typeface="Plantagenet Cherokee"/>
+        <a:font script="Yiii" typeface="Microsoft Yi Baiti"/>
+        <a:font script="Tibt" typeface="Microsoft Himalaya"/>
+        <a:font script="Thaa" typeface="MV Boli"/>
+        <a:font script="Deva" typeface="Mangal"/>
+        <a:font script="Telu" typeface="Gautami"/>
+        <a:font script="Taml" typeface="Latha"/>
+        <a:font script="Syrc" typeface="Estrangelo Edessa"/>
+        <a:font script="Orya" typeface="Kalinga"/>
+        <a:font script="Mlym" typeface="Kartika"/>
+        <a:font script="Laoo" typeface="DokChampa"/>
+        <a:font script="Sinh" typeface="Iskoola Pota"/>
+        <a:font script="Mong" typeface="Mongolian Baiti"/>
+        <a:font script="Viet" typeface="Times New Roman"/>
+        <a:font script="Uigh" typeface="Microsoft Uighur"/>
+        <a:font script="Geor" typeface="Sylfaen"/>
+        <a:font script="Armn" typeface="Arial"/>
+        <a:font script="Bugi" typeface="Leelawadee UI"/>
+        <a:font script="Bopo" typeface="Microsoft JhengHei"/>
+        <a:font script="Java" typeface="Javanese Text"/>
+        <a:font script="Lisu" typeface="Segoe UI"/>
+        <a:font script="Mymr" typeface="Myanmar Text"/>
+        <a:font script="Nkoo" typeface="Ebrima"/>
+        <a:font script="Olck" typeface="Nirmala UI"/>
+        <a:font script="Osma" typeface="Ebrima"/>
+        <a:font script="Phag" typeface="Phagspa"/>
+        <a:font script="Syrn" typeface="Estrangelo Edessa"/>
+        <a:font script="Syrj" typeface="Estrangelo Edessa"/>
+        <a:font script="Syre" typeface="Estrangelo Edessa"/>
+        <a:font script="Sora" typeface="Nirmala UI"/>
+        <a:font script="Tale" typeface="Microsoft Tai Le"/>
+        <a:font script="Talu" typeface="Microsoft New Tai Lue"/>
+        <a:font script="Tfng" typeface="Ebrima"/>
+      </a:majorFont>
+      <a:minorFont>
+        <a:latin typeface="Calibri" panose="020F0502020204030204"/>
+        <a:ea typeface=""/>
+        <a:cs typeface=""/>
+        <a:font script="Jpan" typeface="游ゴシック"/>
+        <a:font script="Hang" typeface="맑은 고딕"/>
+        <a:font script="Hans" typeface="等线"/>
+        <a:font script="Hant" typeface="新細明體"/>
+        <a:font script="Arab" typeface="Arial"/>
+        <a:font script="Hebr" typeface="Arial"/>
+        <a:font script="Thai" typeface="Cordia New"/>
+        <a:font script="Ethi" typeface="Nyala"/>
+        <a:font script="Beng" typeface="Vrinda"/>
+        <a:font script="Gujr" typeface="Shruti"/>
+        <a:font script="Khmr" typeface="DaunPenh"/>
+        <a:font script="Knda" typeface="Tunga"/>
+        <a:font script="Guru" typeface="Raavi"/>
+        <a:font script="Cans" typeface="Euphemia"/>
+        <a:font script="Cher" typeface="Plantagenet Cherokee"/>
+        <a:font script="Yiii" typeface="Microsoft Yi Baiti"/>
+        <a:font script="Tibt" typeface="Microsoft Himalaya"/>
+        <a:font script="Thaa" typeface="MV Boli"/>
+        <a:font script="Deva" typeface="Mangal"/>
+        <a:font script="Telu" typeface="Gautami"/>
+        <a:font script="Taml" typeface="Latha"/>
+        <a:font script="Syrc" typeface="Estrangelo Edessa"/>
+        <a:font script="Orya" typeface="Kalinga"/>
+        <a:font script="Mlym" typeface="Kartika"/>
+        <a:font script="Laoo" typeface="DokChampa"/>
+        <a:font script="Sinh" typeface="Iskoola Pota"/>
+        <a:font script="Mong" typeface="Mongolian Baiti"/>
+        <a:font script="Viet" typeface="Arial"/>
+        <a:font script="Uigh" typeface="Microsoft Uighur"/>
+        <a:font script="Geor" typeface="Sylfaen"/>
+        <a:font script="Armn" typeface="Arial"/>
+        <a:font script="Bugi" typeface="Leelawadee UI"/>
+        <a:font script="Bopo" typeface="Microsoft JhengHei"/>
+        <a:font script="Java" typeface="Javanese Text"/>
+        <a:font script="Lisu" typeface="Segoe UI"/>
+        <a:font script="Mymr" typeface="Myanmar Text"/>
+        <a:font script="Nkoo" typeface="Ebrima"/>
+        <a:font script="Olck" typeface="Nirmala UI"/>
+        <a:font script="Osma" typeface="Ebrima"/>
+        <a:font script="Phag" typeface="Phagspa"/>
+        <a:font script="Syrn" typeface="Estrangelo Edessa"/>
+        <a:font script="Syrj" typeface="Estrangelo Edessa"/>
+        <a:font script="Syre" typeface="Estrangelo Edessa"/>
+        <a:font script="Sora" typeface="Nirmala UI"/>
+        <a:font script="Tale" typeface="Microsoft Tai Le"/>
+        <a:font script="Talu" typeface="Microsoft New Tai Lue"/>
+        <a:font script="Tfng" typeface="Ebrima"/>
+      </a:minorFont>
+    </a:fontScheme>
+    <a:fmtScheme name="Office">
+      <a:fillStyleLst>
+        <a:solidFill>
+          <a:schemeClr val="phClr"/>
+        </a:solidFill>
+        <a:gradFill rotWithShape="1">
+          <a:gsLst>
+            <a:gs pos="0">
+              <a:schemeClr val="phClr">
+                <a:lumMod val="110000"/>
+                <a:satMod val="105000"/>
+                <a:tint val="67000"/>
+              </a:schemeClr>
+            </a:gs>
+            <a:gs pos="50000">
+              <a:schemeClr val="phClr">
+                <a:lumMod val="105000"/>
+                <a:satMod val="103000"/>
+                <a:tint val="73000"/>
+              </a:schemeClr>
+            </a:gs>
+            <a:gs pos="100000">
+              <a:schemeClr val="phClr">
+                <a:lumMod val="105000"/>
+                <a:satMod val="109000"/>
+                <a:tint val="81000"/>
+              </a:schemeClr>
+            </a:gs>
+          </a:gsLst>
+          <a:lin ang="5400000" scaled="0"/>
+        </a:gradFill>
+        <a:gradFill rotWithShape="1">
+          <a:gsLst>
+            <a:gs pos="0">
+              <a:schemeClr val="phClr">
+                <a:satMod val="103000"/>
+                <a:lumMod val="102000"/>
+                <a:tint val="94000"/>
+              </a:schemeClr>
+            </a:gs>
+            <a:gs pos="50000">
+              <a:schemeClr val="phClr">
+                <a:satMod val="110000"/>
+                <a:lumMod val="100000"/>
+                <a:shade val="100000"/>
+              </a:schemeClr>
+            </a:gs>
+            <a:gs pos="100000">
+              <a:schemeClr val="phClr">
+                <a:lumMod val="99000"/>
+                <a:satMod val="120000"/>
+                <a:shade val="78000"/>
+              </a:schemeClr>
+            </a:gs>
+          </a:gsLst>
+          <a:lin ang="5400000" scaled="0"/>
+        </a:gradFill>
+      </a:fillStyleLst>
+      <a:lnStyleLst>
+        <a:ln w="6350" cap="flat" cmpd="sng" algn="ctr">
+          <a:solidFill>
+            <a:schemeClr val="phClr"/>
+          </a:solidFill>
+          <a:prstDash val="solid"/>
+          <a:miter lim="800000"/>
+        </a:ln>
+        <a:ln w="12700" cap="flat" cmpd="sng" algn="ctr">
+          <a:solidFill>
+            <a:schemeClr val="phClr"/>
+          </a:solidFill>
+          <a:prstDash val="solid"/>
+          <a:miter lim="800000"/>
+        </a:ln>
+        <a:ln w="19050" cap="flat" cmpd="sng" algn="ctr">
+          <a:solidFill>
+            <a:schemeClr val="phClr"/>
+          </a:solidFill>
+          <a:prstDash val="solid"/>
+          <a:miter lim="800000"/>
+        </a:ln>
+      </a:lnStyleLst>
+      <a:effectStyleLst>
+        <a:effectStyle>
+          <a:effectLst/>
+        </a:effectStyle>
+        <a:effectStyle>
+          <a:effectLst/>
+        </a:effectStyle>
+        <a:effectStyle>
+          <a:effectLst>
+            <a:outerShdw blurRad="57150" dist="19050" dir="5400000" algn="ctr" rotWithShape="0">
+              <a:srgbClr val="000000">
+                <a:alpha val="63000"/>
+              </a:srgbClr>
+            </a:outerShdw>
+          </a:effectLst>
+        </a:effectStyle>
+      </a:effectStyleLst>
+      <a:bgFillStyleLst>
+        <a:solidFill>
+          <a:schemeClr val="phClr"/>
+        </a:solidFill>
+        <a:solidFill>
+          <a:schemeClr val="phClr">
+            <a:tint val="95000"/>
+            <a:satMod val="170000"/>
+          </a:schemeClr>
+        </a:solidFill>
+        <a:gradFill rotWithShape="1">
+          <a:gsLst>
+            <a:gs pos="0">
+              <a:schemeClr val="phClr">
+                <a:tint val="93000"/>
+                <a:satMod val="150000"/>
+                <a:shade val="98000"/>
+                <a:lumMod val="102000"/>
+              </a:schemeClr>
+            </a:gs>
+            <a:gs pos="50000">
+              <a:schemeClr val="phClr">
+                <a:tint val="98000"/>
+                <a:satMod val="130000"/>
+                <a:shade val="90000"/>
+                <a:lumMod val="103000"/>
+              </a:schemeClr>
+            </a:gs>
+            <a:gs pos="100000">
+              <a:schemeClr val="phClr">
+                <a:shade val="63000"/>
+                <a:satMod val="120000"/>
+              </a:schemeClr>
+            </a:gs>
+          </a:gsLst>
+          <a:lin ang="5400000" scaled="0"/>
+        </a:gradFill>
+      </a:bgFillStyleLst>
+    </a:fmtScheme>
+  </a:themeElements>
+  <a:objectDefaults/>
+  <a:extraClrSchemeLst/>
+  <a:extLst>
+    <a:ext uri="{05A4C25C-085E-4340-85A3-A5531E510DB2}">
+      <thm15:themeFamily xmlns:thm15="http://schemas.microsoft.com/office/thememl/2012/main" name="Office Theme" id="{62F939B6-93AF-4DB8-9C6B-D6C7DFDC589F}" vid="{4A3C46E8-61CC-4603-A589-7422A47A8E4A}"/>
+    </a:ext>
+  </a:extLst>
+</a:theme>
 </file>
</xml_diff>